<commit_message>
Update Capstone 3 - Ad AB Testing Final Presentation.pptx
</commit_message>
<xml_diff>
--- a/Capstone 3 - AB Testing/Reports/Capstone 3 - Ad AB Testing Final Presentation.pptx
+++ b/Capstone 3 - AB Testing/Reports/Capstone 3 - Ad AB Testing Final Presentation.pptx
@@ -11,15 +11,14 @@
     <p:sldId id="266" r:id="rId5"/>
     <p:sldId id="267" r:id="rId6"/>
     <p:sldId id="281" r:id="rId7"/>
-    <p:sldId id="283" r:id="rId8"/>
-    <p:sldId id="276" r:id="rId9"/>
-    <p:sldId id="277" r:id="rId10"/>
-    <p:sldId id="278" r:id="rId11"/>
-    <p:sldId id="279" r:id="rId12"/>
-    <p:sldId id="284" r:id="rId13"/>
-    <p:sldId id="282" r:id="rId14"/>
-    <p:sldId id="280" r:id="rId15"/>
-    <p:sldId id="264" r:id="rId16"/>
+    <p:sldId id="276" r:id="rId8"/>
+    <p:sldId id="277" r:id="rId9"/>
+    <p:sldId id="278" r:id="rId10"/>
+    <p:sldId id="279" r:id="rId11"/>
+    <p:sldId id="284" r:id="rId12"/>
+    <p:sldId id="282" r:id="rId13"/>
+    <p:sldId id="280" r:id="rId14"/>
+    <p:sldId id="264" r:id="rId15"/>
   </p:sldIdLst>
   <p:sldSz cx="12192000" cy="6858000"/>
   <p:notesSz cx="6858000" cy="9144000"/>
@@ -118,13 +117,18 @@
       </a:defRPr>
     </a:lvl9pPr>
   </p:defaultTextStyle>
+  <p:extLst>
+    <p:ext uri="{EFAFB233-063F-42B5-8137-9DF3F51BA10A}">
+      <p15:sldGuideLst xmlns:p15="http://schemas.microsoft.com/office/powerpoint/2012/main"/>
+    </p:ext>
+  </p:extLst>
 </p:presentation>
 </file>
 
 <file path=ppt/revisionInfo.xml><?xml version="1.0" encoding="utf-8"?>
 <p1510:revInfo xmlns:a="http://schemas.openxmlformats.org/drawingml/2006/main" xmlns:r="http://schemas.openxmlformats.org/officeDocument/2006/relationships" xmlns:p1510="http://schemas.microsoft.com/office/powerpoint/2015/10/main">
   <p1510:revLst>
-    <p1510:client id="{7B00C2FD-0E43-40FA-94CB-0CCCA6440D89}" v="19" dt="2021-10-28T20:22:24.764"/>
+    <p1510:client id="{7B00C2FD-0E43-40FA-94CB-0CCCA6440D89}" v="20" dt="2021-10-28T20:28:13.729"/>
   </p1510:revLst>
 </p1510:revInfo>
 </file>
@@ -134,7 +138,7 @@
   <pc:docChgLst>
     <pc:chgData name="Kenney Kwan" userId="7e8312c5ae1ba077" providerId="LiveId" clId="{7B00C2FD-0E43-40FA-94CB-0CCCA6440D89}"/>
     <pc:docChg chg="undo redo custSel addSld delSld modSld sldOrd">
-      <pc:chgData name="Kenney Kwan" userId="7e8312c5ae1ba077" providerId="LiveId" clId="{7B00C2FD-0E43-40FA-94CB-0CCCA6440D89}" dt="2021-10-28T20:23:13.470" v="1729" actId="14100"/>
+      <pc:chgData name="Kenney Kwan" userId="7e8312c5ae1ba077" providerId="LiveId" clId="{7B00C2FD-0E43-40FA-94CB-0CCCA6440D89}" dt="2021-10-28T20:28:22.733" v="1734" actId="47"/>
       <pc:docMkLst>
         <pc:docMk/>
       </pc:docMkLst>
@@ -1523,7 +1527,7 @@
         </pc:spChg>
       </pc:sldChg>
       <pc:sldChg chg="addSp delSp modSp add mod ord setBg setClrOvrMap">
-        <pc:chgData name="Kenney Kwan" userId="7e8312c5ae1ba077" providerId="LiveId" clId="{7B00C2FD-0E43-40FA-94CB-0CCCA6440D89}" dt="2021-10-28T19:52:54.647" v="1063"/>
+        <pc:chgData name="Kenney Kwan" userId="7e8312c5ae1ba077" providerId="LiveId" clId="{7B00C2FD-0E43-40FA-94CB-0CCCA6440D89}" dt="2021-10-28T20:28:20.008" v="1733" actId="1076"/>
         <pc:sldMkLst>
           <pc:docMk/>
           <pc:sldMk cId="1685768048" sldId="281"/>
@@ -1697,7 +1701,15 @@
           </ac:graphicFrameMkLst>
         </pc:graphicFrameChg>
         <pc:picChg chg="add mod">
-          <ac:chgData name="Kenney Kwan" userId="7e8312c5ae1ba077" providerId="LiveId" clId="{7B00C2FD-0E43-40FA-94CB-0CCCA6440D89}" dt="2021-10-28T19:52:40.092" v="1051" actId="14100"/>
+          <ac:chgData name="Kenney Kwan" userId="7e8312c5ae1ba077" providerId="LiveId" clId="{7B00C2FD-0E43-40FA-94CB-0CCCA6440D89}" dt="2021-10-28T20:28:20.008" v="1733" actId="1076"/>
+          <ac:picMkLst>
+            <pc:docMk/>
+            <pc:sldMk cId="1685768048" sldId="281"/>
+            <ac:picMk id="9" creationId="{DE365B5D-7F2C-4BE5-9E5D-2D605669E0C0}"/>
+          </ac:picMkLst>
+        </pc:picChg>
+        <pc:picChg chg="add del mod">
+          <ac:chgData name="Kenney Kwan" userId="7e8312c5ae1ba077" providerId="LiveId" clId="{7B00C2FD-0E43-40FA-94CB-0CCCA6440D89}" dt="2021-10-28T20:28:09.918" v="1730" actId="478"/>
           <ac:picMkLst>
             <pc:docMk/>
             <pc:sldMk cId="1685768048" sldId="281"/>
@@ -1736,8 +1748,8 @@
           </ac:spMkLst>
         </pc:spChg>
       </pc:sldChg>
-      <pc:sldChg chg="addSp delSp modSp add mod ord">
-        <pc:chgData name="Kenney Kwan" userId="7e8312c5ae1ba077" providerId="LiveId" clId="{7B00C2FD-0E43-40FA-94CB-0CCCA6440D89}" dt="2021-10-28T19:52:56.603" v="1065"/>
+      <pc:sldChg chg="addSp delSp modSp add del mod ord">
+        <pc:chgData name="Kenney Kwan" userId="7e8312c5ae1ba077" providerId="LiveId" clId="{7B00C2FD-0E43-40FA-94CB-0CCCA6440D89}" dt="2021-10-28T20:28:22.733" v="1734" actId="47"/>
         <pc:sldMkLst>
           <pc:docMk/>
           <pc:sldMk cId="2601121395" sldId="283"/>
@@ -1766,8 +1778,8 @@
             <ac:graphicFrameMk id="4" creationId="{135B3EB5-A241-4281-8B7A-17FD05BF1027}"/>
           </ac:graphicFrameMkLst>
         </pc:graphicFrameChg>
-        <pc:picChg chg="add mod">
-          <ac:chgData name="Kenney Kwan" userId="7e8312c5ae1ba077" providerId="LiveId" clId="{7B00C2FD-0E43-40FA-94CB-0CCCA6440D89}" dt="2021-10-28T19:52:26.258" v="1049" actId="14100"/>
+        <pc:picChg chg="add del mod">
+          <ac:chgData name="Kenney Kwan" userId="7e8312c5ae1ba077" providerId="LiveId" clId="{7B00C2FD-0E43-40FA-94CB-0CCCA6440D89}" dt="2021-10-28T20:28:12.253" v="1731" actId="478"/>
           <ac:picMkLst>
             <pc:docMk/>
             <pc:sldMk cId="2601121395" sldId="283"/>
@@ -5236,880 +5248,6 @@
 </file>
 
 <file path=ppt/slides/slide10.xml><?xml version="1.0" encoding="utf-8"?>
-<p:sld xmlns:a="http://schemas.openxmlformats.org/drawingml/2006/main" xmlns:r="http://schemas.openxmlformats.org/officeDocument/2006/relationships" xmlns:p="http://schemas.openxmlformats.org/presentationml/2006/main">
-  <p:cSld>
-    <p:bg>
-      <p:bgPr>
-        <a:solidFill>
-          <a:schemeClr val="bg1"/>
-        </a:solidFill>
-        <a:effectLst/>
-      </p:bgPr>
-    </p:bg>
-    <p:spTree>
-      <p:nvGrpSpPr>
-        <p:cNvPr id="1" name=""/>
-        <p:cNvGrpSpPr/>
-        <p:nvPr/>
-      </p:nvGrpSpPr>
-      <p:grpSpPr>
-        <a:xfrm>
-          <a:off x="0" y="0"/>
-          <a:ext cx="0" cy="0"/>
-          <a:chOff x="0" y="0"/>
-          <a:chExt cx="0" cy="0"/>
-        </a:xfrm>
-      </p:grpSpPr>
-      <p:sp useBgFill="1">
-        <p:nvSpPr>
-          <p:cNvPr id="38" name="Rectangle 37">
-            <a:extLst>
-              <a:ext uri="{FF2B5EF4-FFF2-40B4-BE49-F238E27FC236}">
-                <a16:creationId xmlns:a16="http://schemas.microsoft.com/office/drawing/2014/main" id="{911A6C77-6109-4F77-975B-C375615A557E}"/>
-              </a:ext>
-              <a:ext uri="{C183D7F6-B498-43B3-948B-1728B52AA6E4}">
-                <adec:decorative xmlns:adec="http://schemas.microsoft.com/office/drawing/2017/decorative" val="1"/>
-              </a:ext>
-            </a:extLst>
-          </p:cNvPr>
-          <p:cNvSpPr>
-            <a:spLocks noGrp="1" noRot="1" noChangeAspect="1" noMove="1" noResize="1" noEditPoints="1" noAdjustHandles="1" noChangeArrowheads="1" noChangeShapeType="1" noTextEdit="1"/>
-          </p:cNvSpPr>
-          <p:nvPr>
-            <p:extLst>
-              <p:ext uri="{386F3935-93C4-4BCD-93E2-E3B085C9AB24}">
-                <p16:designElem xmlns:p16="http://schemas.microsoft.com/office/powerpoint/2015/main" val="1"/>
-              </p:ext>
-            </p:extLst>
-          </p:nvPr>
-        </p:nvSpPr>
-        <p:spPr>
-          <a:xfrm>
-            <a:off x="0" y="0"/>
-            <a:ext cx="12188952" cy="6858000"/>
-          </a:xfrm>
-          <a:prstGeom prst="rect">
-            <a:avLst/>
-          </a:prstGeom>
-          <a:ln>
-            <a:noFill/>
-          </a:ln>
-        </p:spPr>
-        <p:style>
-          <a:lnRef idx="2">
-            <a:schemeClr val="accent1">
-              <a:shade val="50000"/>
-            </a:schemeClr>
-          </a:lnRef>
-          <a:fillRef idx="1">
-            <a:schemeClr val="accent1"/>
-          </a:fillRef>
-          <a:effectRef idx="0">
-            <a:schemeClr val="accent1"/>
-          </a:effectRef>
-          <a:fontRef idx="minor">
-            <a:schemeClr val="lt1"/>
-          </a:fontRef>
-        </p:style>
-        <p:txBody>
-          <a:bodyPr rtlCol="0" anchor="ctr"/>
-          <a:lstStyle/>
-          <a:p>
-            <a:pPr algn="ctr"/>
-            <a:endParaRPr lang="en-US"/>
-          </a:p>
-        </p:txBody>
-      </p:sp>
-      <p:grpSp>
-        <p:nvGrpSpPr>
-          <p:cNvPr id="40" name="Group 39">
-            <a:extLst>
-              <a:ext uri="{FF2B5EF4-FFF2-40B4-BE49-F238E27FC236}">
-                <a16:creationId xmlns:a16="http://schemas.microsoft.com/office/drawing/2014/main" id="{CB343D17-9934-455E-B326-2F39206BA44A}"/>
-              </a:ext>
-              <a:ext uri="{C183D7F6-B498-43B3-948B-1728B52AA6E4}">
-                <adec:decorative xmlns:adec="http://schemas.microsoft.com/office/drawing/2017/decorative" val="1"/>
-              </a:ext>
-            </a:extLst>
-          </p:cNvPr>
-          <p:cNvGrpSpPr>
-            <a:grpSpLocks noGrp="1" noUngrp="1" noRot="1" noChangeAspect="1" noMove="1" noResize="1"/>
-          </p:cNvGrpSpPr>
-          <p:nvPr>
-            <p:extLst>
-              <p:ext uri="{386F3935-93C4-4BCD-93E2-E3B085C9AB24}">
-                <p16:designElem xmlns:p16="http://schemas.microsoft.com/office/powerpoint/2015/main" val="1"/>
-              </p:ext>
-            </p:extLst>
-          </p:nvPr>
-        </p:nvGrpSpPr>
-        <p:grpSpPr>
-          <a:xfrm>
-            <a:off x="409710" y="635715"/>
-            <a:ext cx="11142208" cy="2482136"/>
-            <a:chOff x="409710" y="635715"/>
-            <a:chExt cx="11142208" cy="2482136"/>
-          </a:xfrm>
-        </p:grpSpPr>
-        <p:sp>
-          <p:nvSpPr>
-            <p:cNvPr id="41" name="Freeform 44">
-              <a:extLst>
-                <a:ext uri="{FF2B5EF4-FFF2-40B4-BE49-F238E27FC236}">
-                  <a16:creationId xmlns:a16="http://schemas.microsoft.com/office/drawing/2014/main" id="{A8AA2B63-BFCD-40D0-B2D0-CB714D70E2E4}"/>
-                </a:ext>
-                <a:ext uri="{C183D7F6-B498-43B3-948B-1728B52AA6E4}">
-                  <adec:decorative xmlns:adec="http://schemas.microsoft.com/office/drawing/2017/decorative" val="1"/>
-                </a:ext>
-              </a:extLst>
-            </p:cNvPr>
-            <p:cNvSpPr>
-              <a:spLocks/>
-            </p:cNvSpPr>
-            <p:nvPr>
-              <p:extLst>
-                <p:ext uri="{386F3935-93C4-4BCD-93E2-E3B085C9AB24}">
-                  <p16:designElem xmlns:p16="http://schemas.microsoft.com/office/powerpoint/2015/main" val="1"/>
-                </p:ext>
-              </p:extLst>
-            </p:nvPr>
-          </p:nvSpPr>
-          <p:spPr bwMode="auto">
-            <a:xfrm>
-              <a:off x="11223203" y="635716"/>
-              <a:ext cx="328612" cy="1742360"/>
-            </a:xfrm>
-            <a:custGeom>
-              <a:avLst/>
-              <a:gdLst>
-                <a:gd name="T0" fmla="*/ 207 w 207"/>
-                <a:gd name="T1" fmla="*/ 987 h 1114"/>
-                <a:gd name="T2" fmla="*/ 0 w 207"/>
-                <a:gd name="T3" fmla="*/ 1114 h 1114"/>
-                <a:gd name="T4" fmla="*/ 0 w 207"/>
-                <a:gd name="T5" fmla="*/ 127 h 1114"/>
-                <a:gd name="T6" fmla="*/ 207 w 207"/>
-                <a:gd name="T7" fmla="*/ 0 h 1114"/>
-                <a:gd name="T8" fmla="*/ 207 w 207"/>
-                <a:gd name="T9" fmla="*/ 987 h 1114"/>
-              </a:gdLst>
-              <a:ahLst/>
-              <a:cxnLst>
-                <a:cxn ang="0">
-                  <a:pos x="T0" y="T1"/>
-                </a:cxn>
-                <a:cxn ang="0">
-                  <a:pos x="T2" y="T3"/>
-                </a:cxn>
-                <a:cxn ang="0">
-                  <a:pos x="T4" y="T5"/>
-                </a:cxn>
-                <a:cxn ang="0">
-                  <a:pos x="T6" y="T7"/>
-                </a:cxn>
-                <a:cxn ang="0">
-                  <a:pos x="T8" y="T9"/>
-                </a:cxn>
-              </a:cxnLst>
-              <a:rect l="0" t="0" r="r" b="b"/>
-              <a:pathLst>
-                <a:path w="207" h="1114">
-                  <a:moveTo>
-                    <a:pt x="207" y="987"/>
-                  </a:moveTo>
-                  <a:lnTo>
-                    <a:pt x="0" y="1114"/>
-                  </a:lnTo>
-                  <a:lnTo>
-                    <a:pt x="0" y="127"/>
-                  </a:lnTo>
-                  <a:lnTo>
-                    <a:pt x="207" y="0"/>
-                  </a:lnTo>
-                  <a:lnTo>
-                    <a:pt x="207" y="987"/>
-                  </a:lnTo>
-                  <a:close/>
-                </a:path>
-              </a:pathLst>
-            </a:custGeom>
-            <a:solidFill>
-              <a:schemeClr val="accent1">
-                <a:lumMod val="50000"/>
-              </a:schemeClr>
-            </a:solidFill>
-            <a:ln>
-              <a:noFill/>
-            </a:ln>
-          </p:spPr>
-          <p:txBody>
-            <a:bodyPr vert="horz" wrap="square" lIns="91440" tIns="45720" rIns="91440" bIns="45720" numCol="1" anchor="t" anchorCtr="0" compatLnSpc="1">
-              <a:prstTxWarp prst="textNoShape">
-                <a:avLst/>
-              </a:prstTxWarp>
-            </a:bodyPr>
-            <a:lstStyle/>
-            <a:p>
-              <a:endParaRPr lang="en-US"/>
-            </a:p>
-          </p:txBody>
-        </p:sp>
-        <p:sp>
-          <p:nvSpPr>
-            <p:cNvPr id="42" name="Freeform 45">
-              <a:extLst>
-                <a:ext uri="{FF2B5EF4-FFF2-40B4-BE49-F238E27FC236}">
-                  <a16:creationId xmlns:a16="http://schemas.microsoft.com/office/drawing/2014/main" id="{80834EBB-06EA-4C69-AF7A-D5A4E69D8A83}"/>
-                </a:ext>
-                <a:ext uri="{C183D7F6-B498-43B3-948B-1728B52AA6E4}">
-                  <adec:decorative xmlns:adec="http://schemas.microsoft.com/office/drawing/2017/decorative" val="1"/>
-                </a:ext>
-              </a:extLst>
-            </p:cNvPr>
-            <p:cNvSpPr>
-              <a:spLocks/>
-            </p:cNvSpPr>
-            <p:nvPr>
-              <p:extLst>
-                <p:ext uri="{386F3935-93C4-4BCD-93E2-E3B085C9AB24}">
-                  <p16:designElem xmlns:p16="http://schemas.microsoft.com/office/powerpoint/2015/main" val="1"/>
-                </p:ext>
-              </p:extLst>
-            </p:nvPr>
-          </p:nvSpPr>
-          <p:spPr bwMode="auto">
-            <a:xfrm>
-              <a:off x="409710" y="1022350"/>
-              <a:ext cx="709612" cy="2095501"/>
-            </a:xfrm>
-            <a:custGeom>
-              <a:avLst/>
-              <a:gdLst>
-                <a:gd name="T0" fmla="*/ 447 w 447"/>
-                <a:gd name="T1" fmla="*/ 1363 h 1363"/>
-                <a:gd name="T2" fmla="*/ 0 w 447"/>
-                <a:gd name="T3" fmla="*/ 987 h 1363"/>
-                <a:gd name="T4" fmla="*/ 0 w 447"/>
-                <a:gd name="T5" fmla="*/ 0 h 1363"/>
-                <a:gd name="T6" fmla="*/ 447 w 447"/>
-                <a:gd name="T7" fmla="*/ 376 h 1363"/>
-                <a:gd name="T8" fmla="*/ 447 w 447"/>
-                <a:gd name="T9" fmla="*/ 1363 h 1363"/>
-              </a:gdLst>
-              <a:ahLst/>
-              <a:cxnLst>
-                <a:cxn ang="0">
-                  <a:pos x="T0" y="T1"/>
-                </a:cxn>
-                <a:cxn ang="0">
-                  <a:pos x="T2" y="T3"/>
-                </a:cxn>
-                <a:cxn ang="0">
-                  <a:pos x="T4" y="T5"/>
-                </a:cxn>
-                <a:cxn ang="0">
-                  <a:pos x="T6" y="T7"/>
-                </a:cxn>
-                <a:cxn ang="0">
-                  <a:pos x="T8" y="T9"/>
-                </a:cxn>
-              </a:cxnLst>
-              <a:rect l="0" t="0" r="r" b="b"/>
-              <a:pathLst>
-                <a:path w="447" h="1363">
-                  <a:moveTo>
-                    <a:pt x="447" y="1363"/>
-                  </a:moveTo>
-                  <a:lnTo>
-                    <a:pt x="0" y="987"/>
-                  </a:lnTo>
-                  <a:lnTo>
-                    <a:pt x="0" y="0"/>
-                  </a:lnTo>
-                  <a:lnTo>
-                    <a:pt x="447" y="376"/>
-                  </a:lnTo>
-                  <a:lnTo>
-                    <a:pt x="447" y="1363"/>
-                  </a:lnTo>
-                  <a:close/>
-                </a:path>
-              </a:pathLst>
-            </a:custGeom>
-            <a:solidFill>
-              <a:schemeClr val="accent1">
-                <a:lumMod val="50000"/>
-              </a:schemeClr>
-            </a:solidFill>
-            <a:ln>
-              <a:noFill/>
-            </a:ln>
-          </p:spPr>
-          <p:txBody>
-            <a:bodyPr vert="horz" wrap="square" lIns="91440" tIns="45720" rIns="91440" bIns="45720" numCol="1" anchor="t" anchorCtr="0" compatLnSpc="1">
-              <a:prstTxWarp prst="textNoShape">
-                <a:avLst/>
-              </a:prstTxWarp>
-            </a:bodyPr>
-            <a:lstStyle/>
-            <a:p>
-              <a:endParaRPr lang="en-US"/>
-            </a:p>
-          </p:txBody>
-        </p:sp>
-        <p:sp>
-          <p:nvSpPr>
-            <p:cNvPr id="43" name="Freeform 46">
-              <a:extLst>
-                <a:ext uri="{FF2B5EF4-FFF2-40B4-BE49-F238E27FC236}">
-                  <a16:creationId xmlns:a16="http://schemas.microsoft.com/office/drawing/2014/main" id="{2D314EC1-63E0-43B5-9CD5-F25593B2CA39}"/>
-                </a:ext>
-                <a:ext uri="{C183D7F6-B498-43B3-948B-1728B52AA6E4}">
-                  <adec:decorative xmlns:adec="http://schemas.microsoft.com/office/drawing/2017/decorative" val="1"/>
-                </a:ext>
-              </a:extLst>
-            </p:cNvPr>
-            <p:cNvSpPr>
-              <a:spLocks/>
-            </p:cNvSpPr>
-            <p:nvPr>
-              <p:extLst>
-                <p:ext uri="{386F3935-93C4-4BCD-93E2-E3B085C9AB24}">
-                  <p16:designElem xmlns:p16="http://schemas.microsoft.com/office/powerpoint/2015/main" val="1"/>
-                </p:ext>
-              </p:extLst>
-            </p:nvPr>
-          </p:nvSpPr>
-          <p:spPr bwMode="auto">
-            <a:xfrm>
-              <a:off x="409710" y="837744"/>
-              <a:ext cx="403225" cy="1705431"/>
-            </a:xfrm>
-            <a:custGeom>
-              <a:avLst/>
-              <a:gdLst>
-                <a:gd name="T0" fmla="*/ 254 w 254"/>
-                <a:gd name="T1" fmla="*/ 987 h 1109"/>
-                <a:gd name="T2" fmla="*/ 0 w 254"/>
-                <a:gd name="T3" fmla="*/ 1109 h 1109"/>
-                <a:gd name="T4" fmla="*/ 0 w 254"/>
-                <a:gd name="T5" fmla="*/ 119 h 1109"/>
-                <a:gd name="T6" fmla="*/ 254 w 254"/>
-                <a:gd name="T7" fmla="*/ 0 h 1109"/>
-                <a:gd name="T8" fmla="*/ 254 w 254"/>
-                <a:gd name="T9" fmla="*/ 987 h 1109"/>
-              </a:gdLst>
-              <a:ahLst/>
-              <a:cxnLst>
-                <a:cxn ang="0">
-                  <a:pos x="T0" y="T1"/>
-                </a:cxn>
-                <a:cxn ang="0">
-                  <a:pos x="T2" y="T3"/>
-                </a:cxn>
-                <a:cxn ang="0">
-                  <a:pos x="T4" y="T5"/>
-                </a:cxn>
-                <a:cxn ang="0">
-                  <a:pos x="T6" y="T7"/>
-                </a:cxn>
-                <a:cxn ang="0">
-                  <a:pos x="T8" y="T9"/>
-                </a:cxn>
-              </a:cxnLst>
-              <a:rect l="0" t="0" r="r" b="b"/>
-              <a:pathLst>
-                <a:path w="254" h="1109">
-                  <a:moveTo>
-                    <a:pt x="254" y="987"/>
-                  </a:moveTo>
-                  <a:lnTo>
-                    <a:pt x="0" y="1109"/>
-                  </a:lnTo>
-                  <a:lnTo>
-                    <a:pt x="0" y="119"/>
-                  </a:lnTo>
-                  <a:lnTo>
-                    <a:pt x="254" y="0"/>
-                  </a:lnTo>
-                  <a:lnTo>
-                    <a:pt x="254" y="987"/>
-                  </a:lnTo>
-                  <a:close/>
-                </a:path>
-              </a:pathLst>
-            </a:custGeom>
-            <a:solidFill>
-              <a:schemeClr val="accent1">
-                <a:lumMod val="75000"/>
-              </a:schemeClr>
-            </a:solidFill>
-            <a:ln>
-              <a:noFill/>
-            </a:ln>
-          </p:spPr>
-          <p:txBody>
-            <a:bodyPr vert="horz" wrap="square" lIns="91440" tIns="45720" rIns="91440" bIns="45720" numCol="1" anchor="t" anchorCtr="0" compatLnSpc="1">
-              <a:prstTxWarp prst="textNoShape">
-                <a:avLst/>
-              </a:prstTxWarp>
-            </a:bodyPr>
-            <a:lstStyle/>
-            <a:p>
-              <a:endParaRPr lang="en-US"/>
-            </a:p>
-          </p:txBody>
-        </p:sp>
-        <p:sp>
-          <p:nvSpPr>
-            <p:cNvPr id="44" name="Freeform 47">
-              <a:extLst>
-                <a:ext uri="{FF2B5EF4-FFF2-40B4-BE49-F238E27FC236}">
-                  <a16:creationId xmlns:a16="http://schemas.microsoft.com/office/drawing/2014/main" id="{9577EB7D-16A7-4E05-9105-431E729665F5}"/>
-                </a:ext>
-                <a:ext uri="{C183D7F6-B498-43B3-948B-1728B52AA6E4}">
-                  <adec:decorative xmlns:adec="http://schemas.microsoft.com/office/drawing/2017/decorative" val="1"/>
-                </a:ext>
-              </a:extLst>
-            </p:cNvPr>
-            <p:cNvSpPr>
-              <a:spLocks/>
-            </p:cNvSpPr>
-            <p:nvPr>
-              <p:extLst>
-                <p:ext uri="{386F3935-93C4-4BCD-93E2-E3B085C9AB24}">
-                  <p16:designElem xmlns:p16="http://schemas.microsoft.com/office/powerpoint/2015/main" val="1"/>
-                </p:ext>
-              </p:extLst>
-            </p:nvPr>
-          </p:nvSpPr>
-          <p:spPr bwMode="auto">
-            <a:xfrm>
-              <a:off x="644660" y="640894"/>
-              <a:ext cx="168275" cy="1713195"/>
-            </a:xfrm>
-            <a:custGeom>
-              <a:avLst/>
-              <a:gdLst>
-                <a:gd name="T0" fmla="*/ 106 w 106"/>
-                <a:gd name="T1" fmla="*/ 1114 h 1114"/>
-                <a:gd name="T2" fmla="*/ 0 w 106"/>
-                <a:gd name="T3" fmla="*/ 1005 h 1114"/>
-                <a:gd name="T4" fmla="*/ 0 w 106"/>
-                <a:gd name="T5" fmla="*/ 0 h 1114"/>
-                <a:gd name="T6" fmla="*/ 106 w 106"/>
-                <a:gd name="T7" fmla="*/ 110 h 1114"/>
-                <a:gd name="T8" fmla="*/ 106 w 106"/>
-                <a:gd name="T9" fmla="*/ 1114 h 1114"/>
-              </a:gdLst>
-              <a:ahLst/>
-              <a:cxnLst>
-                <a:cxn ang="0">
-                  <a:pos x="T0" y="T1"/>
-                </a:cxn>
-                <a:cxn ang="0">
-                  <a:pos x="T2" y="T3"/>
-                </a:cxn>
-                <a:cxn ang="0">
-                  <a:pos x="T4" y="T5"/>
-                </a:cxn>
-                <a:cxn ang="0">
-                  <a:pos x="T6" y="T7"/>
-                </a:cxn>
-                <a:cxn ang="0">
-                  <a:pos x="T8" y="T9"/>
-                </a:cxn>
-              </a:cxnLst>
-              <a:rect l="0" t="0" r="r" b="b"/>
-              <a:pathLst>
-                <a:path w="106" h="1114">
-                  <a:moveTo>
-                    <a:pt x="106" y="1114"/>
-                  </a:moveTo>
-                  <a:lnTo>
-                    <a:pt x="0" y="1005"/>
-                  </a:lnTo>
-                  <a:lnTo>
-                    <a:pt x="0" y="0"/>
-                  </a:lnTo>
-                  <a:lnTo>
-                    <a:pt x="106" y="110"/>
-                  </a:lnTo>
-                  <a:lnTo>
-                    <a:pt x="106" y="1114"/>
-                  </a:lnTo>
-                  <a:close/>
-                </a:path>
-              </a:pathLst>
-            </a:custGeom>
-            <a:solidFill>
-              <a:schemeClr val="accent1">
-                <a:lumMod val="50000"/>
-              </a:schemeClr>
-            </a:solidFill>
-            <a:ln>
-              <a:noFill/>
-            </a:ln>
-          </p:spPr>
-          <p:txBody>
-            <a:bodyPr vert="horz" wrap="square" lIns="91440" tIns="45720" rIns="91440" bIns="45720" numCol="1" anchor="t" anchorCtr="0" compatLnSpc="1">
-              <a:prstTxWarp prst="textNoShape">
-                <a:avLst/>
-              </a:prstTxWarp>
-            </a:bodyPr>
-            <a:lstStyle/>
-            <a:p>
-              <a:endParaRPr lang="en-US"/>
-            </a:p>
-          </p:txBody>
-        </p:sp>
-        <p:sp>
-          <p:nvSpPr>
-            <p:cNvPr id="45" name="Rectangle 44">
-              <a:extLst>
-                <a:ext uri="{FF2B5EF4-FFF2-40B4-BE49-F238E27FC236}">
-                  <a16:creationId xmlns:a16="http://schemas.microsoft.com/office/drawing/2014/main" id="{EC1741C3-592F-47B5-93A0-66FC0BB97E49}"/>
-                </a:ext>
-                <a:ext uri="{C183D7F6-B498-43B3-948B-1728B52AA6E4}">
-                  <adec:decorative xmlns:adec="http://schemas.microsoft.com/office/drawing/2017/decorative" val="1"/>
-                </a:ext>
-              </a:extLst>
-            </p:cNvPr>
-            <p:cNvSpPr>
-              <a:spLocks noChangeArrowheads="1"/>
-            </p:cNvSpPr>
-            <p:nvPr>
-              <p:extLst>
-                <p:ext uri="{386F3935-93C4-4BCD-93E2-E3B085C9AB24}">
-                  <p16:designElem xmlns:p16="http://schemas.microsoft.com/office/powerpoint/2015/main" val="1"/>
-                </p:ext>
-              </p:extLst>
-            </p:nvPr>
-          </p:nvSpPr>
-          <p:spPr bwMode="auto">
-            <a:xfrm>
-              <a:off x="644055" y="635715"/>
-              <a:ext cx="10907863" cy="1541457"/>
-            </a:xfrm>
-            <a:prstGeom prst="rect">
-              <a:avLst/>
-            </a:prstGeom>
-            <a:solidFill>
-              <a:schemeClr val="accent1"/>
-            </a:solidFill>
-            <a:ln>
-              <a:noFill/>
-            </a:ln>
-          </p:spPr>
-          <p:txBody>
-            <a:bodyPr vert="horz" wrap="square" lIns="91440" tIns="45720" rIns="91440" bIns="45720" numCol="1" anchor="t" anchorCtr="0" compatLnSpc="1">
-              <a:prstTxWarp prst="textNoShape">
-                <a:avLst/>
-              </a:prstTxWarp>
-            </a:bodyPr>
-            <a:lstStyle/>
-            <a:p>
-              <a:endParaRPr lang="en-US"/>
-            </a:p>
-          </p:txBody>
-        </p:sp>
-      </p:grpSp>
-      <p:sp>
-        <p:nvSpPr>
-          <p:cNvPr id="2" name="Title 1">
-            <a:extLst>
-              <a:ext uri="{FF2B5EF4-FFF2-40B4-BE49-F238E27FC236}">
-                <a16:creationId xmlns:a16="http://schemas.microsoft.com/office/drawing/2014/main" id="{424E4552-B777-4187-8FD3-061EA04D4793}"/>
-              </a:ext>
-            </a:extLst>
-          </p:cNvPr>
-          <p:cNvSpPr>
-            <a:spLocks noGrp="1"/>
-          </p:cNvSpPr>
-          <p:nvPr>
-            <p:ph type="title"/>
-          </p:nvPr>
-        </p:nvSpPr>
-        <p:spPr>
-          <a:xfrm>
-            <a:off x="1047280" y="759805"/>
-            <a:ext cx="10306520" cy="1325563"/>
-          </a:xfrm>
-        </p:spPr>
-        <p:txBody>
-          <a:bodyPr>
-            <a:normAutofit/>
-          </a:bodyPr>
-          <a:lstStyle/>
-          <a:p>
-            <a:pPr marL="0" marR="0">
-              <a:spcBef>
-                <a:spcPts val="0"/>
-              </a:spcBef>
-              <a:spcAft>
-                <a:spcPts val="800"/>
-              </a:spcAft>
-            </a:pPr>
-            <a:r>
-              <a:rPr lang="en-US" sz="4000">
-                <a:solidFill>
-                  <a:srgbClr val="FFFFFF"/>
-                </a:solidFill>
-                <a:effectLst/>
-                <a:latin typeface="Calibri" panose="020F0502020204030204" pitchFamily="34" charset="0"/>
-                <a:ea typeface="Calibri" panose="020F0502020204030204" pitchFamily="34" charset="0"/>
-                <a:cs typeface="Times New Roman" panose="02020603050405020304" pitchFamily="18" charset="0"/>
-              </a:rPr>
-              <a:t>Modeling </a:t>
-            </a:r>
-            <a:br>
-              <a:rPr lang="en-US" sz="4000">
-                <a:solidFill>
-                  <a:srgbClr val="FFFFFF"/>
-                </a:solidFill>
-                <a:effectLst/>
-                <a:latin typeface="Calibri" panose="020F0502020204030204" pitchFamily="34" charset="0"/>
-                <a:ea typeface="Calibri" panose="020F0502020204030204" pitchFamily="34" charset="0"/>
-                <a:cs typeface="Times New Roman" panose="02020603050405020304" pitchFamily="18" charset="0"/>
-              </a:rPr>
-            </a:br>
-            <a:r>
-              <a:rPr lang="en-US" sz="4000">
-                <a:solidFill>
-                  <a:srgbClr val="FFFFFF"/>
-                </a:solidFill>
-                <a:effectLst/>
-                <a:latin typeface="Calibri" panose="020F0502020204030204" pitchFamily="34" charset="0"/>
-                <a:ea typeface="Calibri" panose="020F0502020204030204" pitchFamily="34" charset="0"/>
-                <a:cs typeface="Times New Roman" panose="02020603050405020304" pitchFamily="18" charset="0"/>
-              </a:rPr>
-              <a:t>Yes vs </a:t>
-            </a:r>
-            <a:r>
-              <a:rPr lang="en-US" sz="4000">
-                <a:solidFill>
-                  <a:srgbClr val="FFFFFF"/>
-                </a:solidFill>
-                <a:latin typeface="Calibri" panose="020F0502020204030204" pitchFamily="34" charset="0"/>
-                <a:ea typeface="Calibri" panose="020F0502020204030204" pitchFamily="34" charset="0"/>
-                <a:cs typeface="Times New Roman" panose="02020603050405020304" pitchFamily="18" charset="0"/>
-              </a:rPr>
-              <a:t>No</a:t>
-            </a:r>
-            <a:endParaRPr lang="en-US" sz="4000">
-              <a:solidFill>
-                <a:srgbClr val="FFFFFF"/>
-              </a:solidFill>
-              <a:effectLst/>
-              <a:latin typeface="Calibri" panose="020F0502020204030204" pitchFamily="34" charset="0"/>
-              <a:ea typeface="Calibri" panose="020F0502020204030204" pitchFamily="34" charset="0"/>
-              <a:cs typeface="Times New Roman" panose="02020603050405020304" pitchFamily="18" charset="0"/>
-            </a:endParaRPr>
-          </a:p>
-        </p:txBody>
-      </p:sp>
-      <p:pic>
-        <p:nvPicPr>
-          <p:cNvPr id="8" name="Content Placeholder 10" descr="Chart, bar chart&#10;&#10;Description automatically generated">
-            <a:extLst>
-              <a:ext uri="{FF2B5EF4-FFF2-40B4-BE49-F238E27FC236}">
-                <a16:creationId xmlns:a16="http://schemas.microsoft.com/office/drawing/2014/main" id="{FD233703-6663-4C7B-8817-83FF3DDBB437}"/>
-              </a:ext>
-            </a:extLst>
-          </p:cNvPr>
-          <p:cNvPicPr>
-            <a:picLocks noChangeAspect="1"/>
-          </p:cNvPicPr>
-          <p:nvPr/>
-        </p:nvPicPr>
-        <p:blipFill rotWithShape="1">
-          <a:blip r:embed="rId2">
-            <a:extLst>
-              <a:ext uri="{28A0092B-C50C-407E-A947-70E740481C1C}">
-                <a14:useLocalDpi xmlns:a14="http://schemas.microsoft.com/office/drawing/2010/main" val="0"/>
-              </a:ext>
-            </a:extLst>
-          </a:blip>
-          <a:srcRect l="18885" r="1626" b="5"/>
-          <a:stretch/>
-        </p:blipFill>
-        <p:spPr>
-          <a:xfrm>
-            <a:off x="1119322" y="2177171"/>
-            <a:ext cx="4490271" cy="4321811"/>
-          </a:xfrm>
-          <a:prstGeom prst="rect">
-            <a:avLst/>
-          </a:prstGeom>
-        </p:spPr>
-      </p:pic>
-      <p:sp>
-        <p:nvSpPr>
-          <p:cNvPr id="3" name="Content Placeholder 2">
-            <a:extLst>
-              <a:ext uri="{FF2B5EF4-FFF2-40B4-BE49-F238E27FC236}">
-                <a16:creationId xmlns:a16="http://schemas.microsoft.com/office/drawing/2014/main" id="{1AC994BF-ABF2-4936-BB7B-56B14404FF6D}"/>
-              </a:ext>
-            </a:extLst>
-          </p:cNvPr>
-          <p:cNvSpPr>
-            <a:spLocks noGrp="1"/>
-          </p:cNvSpPr>
-          <p:nvPr>
-            <p:ph idx="1"/>
-          </p:nvPr>
-        </p:nvSpPr>
-        <p:spPr>
-          <a:xfrm>
-            <a:off x="5915980" y="2177171"/>
-            <a:ext cx="5631360" cy="4256285"/>
-          </a:xfrm>
-        </p:spPr>
-        <p:txBody>
-          <a:bodyPr>
-            <a:noAutofit/>
-          </a:bodyPr>
-          <a:lstStyle/>
-          <a:p>
-            <a:pPr marL="0" marR="0" indent="0">
-              <a:spcBef>
-                <a:spcPts val="0"/>
-              </a:spcBef>
-              <a:spcAft>
-                <a:spcPts val="800"/>
-              </a:spcAft>
-              <a:buNone/>
-            </a:pPr>
-            <a:r>
-              <a:rPr lang="en-US" sz="2000" b="1" dirty="0">
-                <a:effectLst/>
-                <a:latin typeface="Calibri" panose="020F0502020204030204" pitchFamily="34" charset="0"/>
-                <a:ea typeface="Calibri" panose="020F0502020204030204" pitchFamily="34" charset="0"/>
-                <a:cs typeface="Times New Roman" panose="02020603050405020304" pitchFamily="18" charset="0"/>
-              </a:rPr>
-              <a:t>Null hypothesis: </a:t>
-            </a:r>
-            <a:r>
-              <a:rPr lang="en-US" sz="2000" dirty="0">
-                <a:effectLst/>
-                <a:latin typeface="Calibri" panose="020F0502020204030204" pitchFamily="34" charset="0"/>
-                <a:ea typeface="Calibri" panose="020F0502020204030204" pitchFamily="34" charset="0"/>
-                <a:cs typeface="Times New Roman" panose="02020603050405020304" pitchFamily="18" charset="0"/>
-              </a:rPr>
-              <a:t>There is no significant difference between the questionnaire engagement rate of both groups</a:t>
-            </a:r>
-          </a:p>
-          <a:p>
-            <a:pPr marL="0" marR="0" indent="0">
-              <a:spcBef>
-                <a:spcPts val="0"/>
-              </a:spcBef>
-              <a:spcAft>
-                <a:spcPts val="800"/>
-              </a:spcAft>
-              <a:buNone/>
-            </a:pPr>
-            <a:r>
-              <a:rPr lang="en-US" sz="2000" b="1" dirty="0">
-                <a:effectLst/>
-                <a:latin typeface="Calibri" panose="020F0502020204030204" pitchFamily="34" charset="0"/>
-                <a:ea typeface="Calibri" panose="020F0502020204030204" pitchFamily="34" charset="0"/>
-                <a:cs typeface="Times New Roman" panose="02020603050405020304" pitchFamily="18" charset="0"/>
-              </a:rPr>
-              <a:t>Alt hypothesis: </a:t>
-            </a:r>
-            <a:r>
-              <a:rPr lang="en-US" sz="2000" dirty="0">
-                <a:effectLst/>
-                <a:latin typeface="Calibri" panose="020F0502020204030204" pitchFamily="34" charset="0"/>
-                <a:ea typeface="Calibri" panose="020F0502020204030204" pitchFamily="34" charset="0"/>
-                <a:cs typeface="Times New Roman" panose="02020603050405020304" pitchFamily="18" charset="0"/>
-              </a:rPr>
-              <a:t>There is significant difference between the questionnaire engagement rate of both groups</a:t>
-            </a:r>
-          </a:p>
-          <a:p>
-            <a:pPr marL="0" marR="0" indent="0">
-              <a:spcBef>
-                <a:spcPts val="0"/>
-              </a:spcBef>
-              <a:spcAft>
-                <a:spcPts val="800"/>
-              </a:spcAft>
-              <a:buNone/>
-            </a:pPr>
-            <a:r>
-              <a:rPr lang="en-US" sz="2000" dirty="0">
-                <a:latin typeface="Calibri" panose="020F0502020204030204" pitchFamily="34" charset="0"/>
-                <a:ea typeface="Calibri" panose="020F0502020204030204" pitchFamily="34" charset="0"/>
-                <a:cs typeface="Times New Roman" panose="02020603050405020304" pitchFamily="18" charset="0"/>
-              </a:rPr>
-              <a:t>P</a:t>
-            </a:r>
-            <a:r>
-              <a:rPr lang="en-US" sz="2000" dirty="0">
-                <a:effectLst/>
-                <a:latin typeface="Calibri" panose="020F0502020204030204" pitchFamily="34" charset="0"/>
-                <a:ea typeface="Calibri" panose="020F0502020204030204" pitchFamily="34" charset="0"/>
-                <a:cs typeface="Times New Roman" panose="02020603050405020304" pitchFamily="18" charset="0"/>
-              </a:rPr>
-              <a:t> value: 0.052</a:t>
-            </a:r>
-          </a:p>
-          <a:p>
-            <a:pPr marL="0" marR="0">
-              <a:spcBef>
-                <a:spcPts val="0"/>
-              </a:spcBef>
-              <a:spcAft>
-                <a:spcPts val="800"/>
-              </a:spcAft>
-            </a:pPr>
-            <a:r>
-              <a:rPr lang="en-US" sz="2000" dirty="0">
-                <a:effectLst/>
-                <a:latin typeface="Calibri" panose="020F0502020204030204" pitchFamily="34" charset="0"/>
-                <a:ea typeface="Calibri" panose="020F0502020204030204" pitchFamily="34" charset="0"/>
-                <a:cs typeface="Times New Roman" panose="02020603050405020304" pitchFamily="18" charset="0"/>
-              </a:rPr>
-              <a:t>Since the p value is greater than 0.05, then we fail to reject the null hypothesis. There is no significant difference in questionnaire engagement between the control group and the exposed group. </a:t>
-            </a:r>
-          </a:p>
-          <a:p>
-            <a:pPr marL="0" marR="0">
-              <a:spcBef>
-                <a:spcPts val="0"/>
-              </a:spcBef>
-              <a:spcAft>
-                <a:spcPts val="800"/>
-              </a:spcAft>
-            </a:pPr>
-            <a:r>
-              <a:rPr lang="en-US" sz="2000" dirty="0">
-                <a:effectLst/>
-                <a:latin typeface="Calibri" panose="020F0502020204030204" pitchFamily="34" charset="0"/>
-                <a:ea typeface="Calibri" panose="020F0502020204030204" pitchFamily="34" charset="0"/>
-                <a:cs typeface="Times New Roman" panose="02020603050405020304" pitchFamily="18" charset="0"/>
-              </a:rPr>
-              <a:t>When filtering out the no response answers. The proportion of users that clicked on yes or no is about the same in both groups. </a:t>
-            </a:r>
-          </a:p>
-        </p:txBody>
-      </p:sp>
-    </p:spTree>
-    <p:extLst>
-      <p:ext uri="{BB962C8B-B14F-4D97-AF65-F5344CB8AC3E}">
-        <p14:creationId xmlns:p14="http://schemas.microsoft.com/office/powerpoint/2010/main" val="1045803295"/>
-      </p:ext>
-    </p:extLst>
-  </p:cSld>
-  <p:clrMapOvr>
-    <a:masterClrMapping/>
-  </p:clrMapOvr>
-</p:sld>
-</file>
-
-<file path=ppt/slides/slide11.xml><?xml version="1.0" encoding="utf-8"?>
 <p:sld xmlns:a="http://schemas.openxmlformats.org/drawingml/2006/main" xmlns:r="http://schemas.openxmlformats.org/officeDocument/2006/relationships" xmlns:p="http://schemas.openxmlformats.org/presentationml/2006/main">
   <p:cSld>
     <p:bg>
@@ -6984,7 +6122,7 @@
 </p:sld>
 </file>
 
-<file path=ppt/slides/slide12.xml><?xml version="1.0" encoding="utf-8"?>
+<file path=ppt/slides/slide11.xml><?xml version="1.0" encoding="utf-8"?>
 <p:sld xmlns:a="http://schemas.openxmlformats.org/drawingml/2006/main" xmlns:r="http://schemas.openxmlformats.org/officeDocument/2006/relationships" xmlns:p="http://schemas.openxmlformats.org/presentationml/2006/main">
   <p:cSld>
     <p:bg>
@@ -8303,7 +7441,7 @@
 </p:sld>
 </file>
 
-<file path=ppt/slides/slide13.xml><?xml version="1.0" encoding="utf-8"?>
+<file path=ppt/slides/slide12.xml><?xml version="1.0" encoding="utf-8"?>
 <p:sld xmlns:a="http://schemas.openxmlformats.org/drawingml/2006/main" xmlns:r="http://schemas.openxmlformats.org/officeDocument/2006/relationships" xmlns:p="http://schemas.openxmlformats.org/presentationml/2006/main">
   <p:cSld>
     <p:bg>
@@ -9065,7 +8203,7 @@
 </p:sld>
 </file>
 
-<file path=ppt/slides/slide14.xml><?xml version="1.0" encoding="utf-8"?>
+<file path=ppt/slides/slide13.xml><?xml version="1.0" encoding="utf-8"?>
 <p:sld xmlns:a="http://schemas.openxmlformats.org/drawingml/2006/main" xmlns:r="http://schemas.openxmlformats.org/officeDocument/2006/relationships" xmlns:p="http://schemas.openxmlformats.org/presentationml/2006/main">
   <p:cSld>
     <p:bg>
@@ -9731,7 +8869,7 @@
 </p:sld>
 </file>
 
-<file path=ppt/slides/slide15.xml><?xml version="1.0" encoding="utf-8"?>
+<file path=ppt/slides/slide14.xml><?xml version="1.0" encoding="utf-8"?>
 <p:sld xmlns:a="http://schemas.openxmlformats.org/drawingml/2006/main" xmlns:r="http://schemas.openxmlformats.org/officeDocument/2006/relationships" xmlns:p="http://schemas.openxmlformats.org/presentationml/2006/main">
   <p:cSld>
     <p:bg>
@@ -13588,42 +12726,6 @@
       </p:sp>
       <p:pic>
         <p:nvPicPr>
-          <p:cNvPr id="24" name="Content Placeholder 6" descr="Chart, bar chart&#10;&#10;Description automatically generated">
-            <a:extLst>
-              <a:ext uri="{FF2B5EF4-FFF2-40B4-BE49-F238E27FC236}">
-                <a16:creationId xmlns:a16="http://schemas.microsoft.com/office/drawing/2014/main" id="{390B9F0A-D676-4497-BB51-10D4E8C96DF6}"/>
-              </a:ext>
-            </a:extLst>
-          </p:cNvPr>
-          <p:cNvPicPr>
-            <a:picLocks noChangeAspect="1"/>
-          </p:cNvPicPr>
-          <p:nvPr/>
-        </p:nvPicPr>
-        <p:blipFill>
-          <a:blip r:embed="rId2">
-            <a:extLst>
-              <a:ext uri="{28A0092B-C50C-407E-A947-70E740481C1C}">
-                <a14:useLocalDpi xmlns:a14="http://schemas.microsoft.com/office/drawing/2010/main" val="0"/>
-              </a:ext>
-            </a:extLst>
-          </a:blip>
-          <a:stretch>
-            <a:fillRect/>
-          </a:stretch>
-        </p:blipFill>
-        <p:spPr>
-          <a:xfrm>
-            <a:off x="6448864" y="1942934"/>
-            <a:ext cx="5333426" cy="4707217"/>
-          </a:xfrm>
-          <a:prstGeom prst="rect">
-            <a:avLst/>
-          </a:prstGeom>
-        </p:spPr>
-      </p:pic>
-      <p:pic>
-        <p:nvPicPr>
           <p:cNvPr id="25" name="Content Placeholder 4" descr="Chart, bar chart, waterfall chart&#10;&#10;Description automatically generated">
             <a:extLst>
               <a:ext uri="{FF2B5EF4-FFF2-40B4-BE49-F238E27FC236}">
@@ -13639,7 +12741,7 @@
           </p:nvPr>
         </p:nvPicPr>
         <p:blipFill>
-          <a:blip r:embed="rId3">
+          <a:blip r:embed="rId2">
             <a:extLst>
               <a:ext uri="{28A0092B-C50C-407E-A947-70E740481C1C}">
                 <a14:useLocalDpi xmlns:a14="http://schemas.microsoft.com/office/drawing/2010/main" val="0"/>
@@ -13654,6 +12756,42 @@
           <a:xfrm>
             <a:off x="812935" y="1892106"/>
             <a:ext cx="5410065" cy="4774859"/>
+          </a:xfrm>
+          <a:prstGeom prst="rect">
+            <a:avLst/>
+          </a:prstGeom>
+        </p:spPr>
+      </p:pic>
+      <p:pic>
+        <p:nvPicPr>
+          <p:cNvPr id="9" name="Content Placeholder 10" descr="Chart, bar chart&#10;&#10;Description automatically generated">
+            <a:extLst>
+              <a:ext uri="{FF2B5EF4-FFF2-40B4-BE49-F238E27FC236}">
+                <a16:creationId xmlns:a16="http://schemas.microsoft.com/office/drawing/2014/main" id="{DE365B5D-7F2C-4BE5-9E5D-2D605669E0C0}"/>
+              </a:ext>
+            </a:extLst>
+          </p:cNvPr>
+          <p:cNvPicPr>
+            <a:picLocks noChangeAspect="1"/>
+          </p:cNvPicPr>
+          <p:nvPr/>
+        </p:nvPicPr>
+        <p:blipFill>
+          <a:blip r:embed="rId3">
+            <a:extLst>
+              <a:ext uri="{28A0092B-C50C-407E-A947-70E740481C1C}">
+                <a14:useLocalDpi xmlns:a14="http://schemas.microsoft.com/office/drawing/2010/main" val="0"/>
+              </a:ext>
+            </a:extLst>
+          </a:blip>
+          <a:stretch>
+            <a:fillRect/>
+          </a:stretch>
+        </p:blipFill>
+        <p:spPr>
+          <a:xfrm>
+            <a:off x="6304789" y="1892106"/>
+            <a:ext cx="5345128" cy="4717546"/>
           </a:xfrm>
           <a:prstGeom prst="rect">
             <a:avLst/>
@@ -13674,493 +12812,6 @@
 </file>
 
 <file path=ppt/slides/slide7.xml><?xml version="1.0" encoding="utf-8"?>
-<p:sld xmlns:a="http://schemas.openxmlformats.org/drawingml/2006/main" xmlns:r="http://schemas.openxmlformats.org/officeDocument/2006/relationships" xmlns:p="http://schemas.openxmlformats.org/presentationml/2006/main">
-  <p:cSld>
-    <p:bg>
-      <p:bgPr>
-        <a:solidFill>
-          <a:schemeClr val="bg1"/>
-        </a:solidFill>
-        <a:effectLst/>
-      </p:bgPr>
-    </p:bg>
-    <p:spTree>
-      <p:nvGrpSpPr>
-        <p:cNvPr id="1" name=""/>
-        <p:cNvGrpSpPr/>
-        <p:nvPr/>
-      </p:nvGrpSpPr>
-      <p:grpSpPr>
-        <a:xfrm>
-          <a:off x="0" y="0"/>
-          <a:ext cx="0" cy="0"/>
-          <a:chOff x="0" y="0"/>
-          <a:chExt cx="0" cy="0"/>
-        </a:xfrm>
-      </p:grpSpPr>
-      <p:sp useBgFill="1">
-        <p:nvSpPr>
-          <p:cNvPr id="39" name="Rectangle 41">
-            <a:extLst>
-              <a:ext uri="{FF2B5EF4-FFF2-40B4-BE49-F238E27FC236}">
-                <a16:creationId xmlns:a16="http://schemas.microsoft.com/office/drawing/2014/main" id="{FDDEF810-FBAE-4C80-B905-316331395C3D}"/>
-              </a:ext>
-              <a:ext uri="{C183D7F6-B498-43B3-948B-1728B52AA6E4}">
-                <adec:decorative xmlns:adec="http://schemas.microsoft.com/office/drawing/2017/decorative" val="1"/>
-              </a:ext>
-            </a:extLst>
-          </p:cNvPr>
-          <p:cNvSpPr>
-            <a:spLocks noGrp="1" noRot="1" noChangeAspect="1" noMove="1" noResize="1" noEditPoints="1" noAdjustHandles="1" noChangeArrowheads="1" noChangeShapeType="1" noTextEdit="1"/>
-          </p:cNvSpPr>
-          <p:nvPr>
-            <p:extLst>
-              <p:ext uri="{386F3935-93C4-4BCD-93E2-E3B085C9AB24}">
-                <p16:designElem xmlns:p16="http://schemas.microsoft.com/office/powerpoint/2015/main" val="1"/>
-              </p:ext>
-            </p:extLst>
-          </p:nvPr>
-        </p:nvSpPr>
-        <p:spPr>
-          <a:xfrm>
-            <a:off x="0" y="0"/>
-            <a:ext cx="12188952" cy="6858000"/>
-          </a:xfrm>
-          <a:prstGeom prst="rect">
-            <a:avLst/>
-          </a:prstGeom>
-          <a:ln>
-            <a:noFill/>
-          </a:ln>
-        </p:spPr>
-        <p:style>
-          <a:lnRef idx="2">
-            <a:schemeClr val="accent1">
-              <a:shade val="50000"/>
-            </a:schemeClr>
-          </a:lnRef>
-          <a:fillRef idx="1">
-            <a:schemeClr val="accent1"/>
-          </a:fillRef>
-          <a:effectRef idx="0">
-            <a:schemeClr val="accent1"/>
-          </a:effectRef>
-          <a:fontRef idx="minor">
-            <a:schemeClr val="lt1"/>
-          </a:fontRef>
-        </p:style>
-        <p:txBody>
-          <a:bodyPr rtlCol="0" anchor="ctr"/>
-          <a:lstStyle/>
-          <a:p>
-            <a:pPr algn="ctr"/>
-            <a:endParaRPr lang="en-US"/>
-          </a:p>
-        </p:txBody>
-      </p:sp>
-      <p:sp>
-        <p:nvSpPr>
-          <p:cNvPr id="43" name="Freeform 46">
-            <a:extLst>
-              <a:ext uri="{FF2B5EF4-FFF2-40B4-BE49-F238E27FC236}">
-                <a16:creationId xmlns:a16="http://schemas.microsoft.com/office/drawing/2014/main" id="{FD8C7A0F-D774-4978-AA9C-7E703C2F463A}"/>
-              </a:ext>
-              <a:ext uri="{C183D7F6-B498-43B3-948B-1728B52AA6E4}">
-                <adec:decorative xmlns:adec="http://schemas.microsoft.com/office/drawing/2017/decorative" val="1"/>
-              </a:ext>
-            </a:extLst>
-          </p:cNvPr>
-          <p:cNvSpPr>
-            <a:spLocks noGrp="1" noRot="1" noChangeAspect="1" noMove="1" noResize="1" noEditPoints="1" noAdjustHandles="1" noChangeArrowheads="1" noChangeShapeType="1" noTextEdit="1"/>
-          </p:cNvSpPr>
-          <p:nvPr>
-            <p:extLst>
-              <p:ext uri="{386F3935-93C4-4BCD-93E2-E3B085C9AB24}">
-                <p16:designElem xmlns:p16="http://schemas.microsoft.com/office/powerpoint/2015/main" val="1"/>
-              </p:ext>
-            </p:extLst>
-          </p:nvPr>
-        </p:nvSpPr>
-        <p:spPr bwMode="auto">
-          <a:xfrm>
-            <a:off x="409710" y="837744"/>
-            <a:ext cx="403225" cy="1344168"/>
-          </a:xfrm>
-          <a:custGeom>
-            <a:avLst/>
-            <a:gdLst>
-              <a:gd name="T0" fmla="*/ 254 w 254"/>
-              <a:gd name="T1" fmla="*/ 987 h 1109"/>
-              <a:gd name="T2" fmla="*/ 0 w 254"/>
-              <a:gd name="T3" fmla="*/ 1109 h 1109"/>
-              <a:gd name="T4" fmla="*/ 0 w 254"/>
-              <a:gd name="T5" fmla="*/ 119 h 1109"/>
-              <a:gd name="T6" fmla="*/ 254 w 254"/>
-              <a:gd name="T7" fmla="*/ 0 h 1109"/>
-              <a:gd name="T8" fmla="*/ 254 w 254"/>
-              <a:gd name="T9" fmla="*/ 987 h 1109"/>
-            </a:gdLst>
-            <a:ahLst/>
-            <a:cxnLst>
-              <a:cxn ang="0">
-                <a:pos x="T0" y="T1"/>
-              </a:cxn>
-              <a:cxn ang="0">
-                <a:pos x="T2" y="T3"/>
-              </a:cxn>
-              <a:cxn ang="0">
-                <a:pos x="T4" y="T5"/>
-              </a:cxn>
-              <a:cxn ang="0">
-                <a:pos x="T6" y="T7"/>
-              </a:cxn>
-              <a:cxn ang="0">
-                <a:pos x="T8" y="T9"/>
-              </a:cxn>
-            </a:cxnLst>
-            <a:rect l="0" t="0" r="r" b="b"/>
-            <a:pathLst>
-              <a:path w="254" h="1109">
-                <a:moveTo>
-                  <a:pt x="254" y="987"/>
-                </a:moveTo>
-                <a:lnTo>
-                  <a:pt x="0" y="1109"/>
-                </a:lnTo>
-                <a:lnTo>
-                  <a:pt x="0" y="119"/>
-                </a:lnTo>
-                <a:lnTo>
-                  <a:pt x="254" y="0"/>
-                </a:lnTo>
-                <a:lnTo>
-                  <a:pt x="254" y="987"/>
-                </a:lnTo>
-                <a:close/>
-              </a:path>
-            </a:pathLst>
-          </a:custGeom>
-          <a:solidFill>
-            <a:schemeClr val="accent1">
-              <a:lumMod val="75000"/>
-            </a:schemeClr>
-          </a:solidFill>
-          <a:ln>
-            <a:noFill/>
-          </a:ln>
-        </p:spPr>
-        <p:txBody>
-          <a:bodyPr vert="horz" wrap="square" lIns="91440" tIns="45720" rIns="91440" bIns="45720" numCol="1" anchor="t" anchorCtr="0" compatLnSpc="1">
-            <a:prstTxWarp prst="textNoShape">
-              <a:avLst/>
-            </a:prstTxWarp>
-          </a:bodyPr>
-          <a:lstStyle/>
-          <a:p>
-            <a:endParaRPr lang="en-US"/>
-          </a:p>
-        </p:txBody>
-      </p:sp>
-      <p:sp>
-        <p:nvSpPr>
-          <p:cNvPr id="45" name="Freeform 47">
-            <a:extLst>
-              <a:ext uri="{FF2B5EF4-FFF2-40B4-BE49-F238E27FC236}">
-                <a16:creationId xmlns:a16="http://schemas.microsoft.com/office/drawing/2014/main" id="{61C7310A-3A42-4F75-8058-7F39E52B11BC}"/>
-              </a:ext>
-              <a:ext uri="{C183D7F6-B498-43B3-948B-1728B52AA6E4}">
-                <adec:decorative xmlns:adec="http://schemas.microsoft.com/office/drawing/2017/decorative" val="1"/>
-              </a:ext>
-            </a:extLst>
-          </p:cNvPr>
-          <p:cNvSpPr>
-            <a:spLocks noGrp="1" noRot="1" noChangeAspect="1" noMove="1" noResize="1" noEditPoints="1" noAdjustHandles="1" noChangeArrowheads="1" noChangeShapeType="1" noTextEdit="1"/>
-          </p:cNvSpPr>
-          <p:nvPr>
-            <p:extLst>
-              <p:ext uri="{386F3935-93C4-4BCD-93E2-E3B085C9AB24}">
-                <p16:designElem xmlns:p16="http://schemas.microsoft.com/office/powerpoint/2015/main" val="1"/>
-              </p:ext>
-            </p:extLst>
-          </p:nvPr>
-        </p:nvSpPr>
-        <p:spPr bwMode="auto">
-          <a:xfrm>
-            <a:off x="644660" y="640894"/>
-            <a:ext cx="168275" cy="1344168"/>
-          </a:xfrm>
-          <a:custGeom>
-            <a:avLst/>
-            <a:gdLst>
-              <a:gd name="T0" fmla="*/ 106 w 106"/>
-              <a:gd name="T1" fmla="*/ 1114 h 1114"/>
-              <a:gd name="T2" fmla="*/ 0 w 106"/>
-              <a:gd name="T3" fmla="*/ 1005 h 1114"/>
-              <a:gd name="T4" fmla="*/ 0 w 106"/>
-              <a:gd name="T5" fmla="*/ 0 h 1114"/>
-              <a:gd name="T6" fmla="*/ 106 w 106"/>
-              <a:gd name="T7" fmla="*/ 110 h 1114"/>
-              <a:gd name="T8" fmla="*/ 106 w 106"/>
-              <a:gd name="T9" fmla="*/ 1114 h 1114"/>
-            </a:gdLst>
-            <a:ahLst/>
-            <a:cxnLst>
-              <a:cxn ang="0">
-                <a:pos x="T0" y="T1"/>
-              </a:cxn>
-              <a:cxn ang="0">
-                <a:pos x="T2" y="T3"/>
-              </a:cxn>
-              <a:cxn ang="0">
-                <a:pos x="T4" y="T5"/>
-              </a:cxn>
-              <a:cxn ang="0">
-                <a:pos x="T6" y="T7"/>
-              </a:cxn>
-              <a:cxn ang="0">
-                <a:pos x="T8" y="T9"/>
-              </a:cxn>
-            </a:cxnLst>
-            <a:rect l="0" t="0" r="r" b="b"/>
-            <a:pathLst>
-              <a:path w="106" h="1114">
-                <a:moveTo>
-                  <a:pt x="106" y="1114"/>
-                </a:moveTo>
-                <a:lnTo>
-                  <a:pt x="0" y="1005"/>
-                </a:lnTo>
-                <a:lnTo>
-                  <a:pt x="0" y="0"/>
-                </a:lnTo>
-                <a:lnTo>
-                  <a:pt x="106" y="110"/>
-                </a:lnTo>
-                <a:lnTo>
-                  <a:pt x="106" y="1114"/>
-                </a:lnTo>
-                <a:close/>
-              </a:path>
-            </a:pathLst>
-          </a:custGeom>
-          <a:solidFill>
-            <a:schemeClr val="accent1">
-              <a:lumMod val="50000"/>
-            </a:schemeClr>
-          </a:solidFill>
-          <a:ln>
-            <a:noFill/>
-          </a:ln>
-        </p:spPr>
-        <p:txBody>
-          <a:bodyPr vert="horz" wrap="square" lIns="91440" tIns="45720" rIns="91440" bIns="45720" numCol="1" anchor="t" anchorCtr="0" compatLnSpc="1">
-            <a:prstTxWarp prst="textNoShape">
-              <a:avLst/>
-            </a:prstTxWarp>
-          </a:bodyPr>
-          <a:lstStyle/>
-          <a:p>
-            <a:endParaRPr lang="en-US"/>
-          </a:p>
-        </p:txBody>
-      </p:sp>
-      <p:sp>
-        <p:nvSpPr>
-          <p:cNvPr id="47" name="Rectangle 47">
-            <a:extLst>
-              <a:ext uri="{FF2B5EF4-FFF2-40B4-BE49-F238E27FC236}">
-                <a16:creationId xmlns:a16="http://schemas.microsoft.com/office/drawing/2014/main" id="{27D88313-56C7-45D8-8D97-2F5CCBF99683}"/>
-              </a:ext>
-              <a:ext uri="{C183D7F6-B498-43B3-948B-1728B52AA6E4}">
-                <adec:decorative xmlns:adec="http://schemas.microsoft.com/office/drawing/2017/decorative" val="1"/>
-              </a:ext>
-            </a:extLst>
-          </p:cNvPr>
-          <p:cNvSpPr>
-            <a:spLocks noGrp="1" noRot="1" noChangeAspect="1" noMove="1" noResize="1" noEditPoints="1" noAdjustHandles="1" noChangeArrowheads="1" noChangeShapeType="1" noTextEdit="1"/>
-          </p:cNvSpPr>
-          <p:nvPr>
-            <p:extLst>
-              <p:ext uri="{386F3935-93C4-4BCD-93E2-E3B085C9AB24}">
-                <p16:designElem xmlns:p16="http://schemas.microsoft.com/office/powerpoint/2015/main" val="1"/>
-              </p:ext>
-            </p:extLst>
-          </p:nvPr>
-        </p:nvSpPr>
-        <p:spPr bwMode="auto">
-          <a:xfrm>
-            <a:off x="644055" y="635715"/>
-            <a:ext cx="11544897" cy="1179576"/>
-          </a:xfrm>
-          <a:prstGeom prst="rect">
-            <a:avLst/>
-          </a:prstGeom>
-          <a:solidFill>
-            <a:schemeClr val="accent1"/>
-          </a:solidFill>
-          <a:ln>
-            <a:noFill/>
-          </a:ln>
-        </p:spPr>
-        <p:txBody>
-          <a:bodyPr vert="horz" wrap="square" lIns="91440" tIns="45720" rIns="91440" bIns="45720" numCol="1" anchor="t" anchorCtr="0" compatLnSpc="1">
-            <a:prstTxWarp prst="textNoShape">
-              <a:avLst/>
-            </a:prstTxWarp>
-          </a:bodyPr>
-          <a:lstStyle/>
-          <a:p>
-            <a:endParaRPr lang="en-US"/>
-          </a:p>
-        </p:txBody>
-      </p:sp>
-      <p:sp>
-        <p:nvSpPr>
-          <p:cNvPr id="2" name="Title 1">
-            <a:extLst>
-              <a:ext uri="{FF2B5EF4-FFF2-40B4-BE49-F238E27FC236}">
-                <a16:creationId xmlns:a16="http://schemas.microsoft.com/office/drawing/2014/main" id="{424E4552-B777-4187-8FD3-061EA04D4793}"/>
-              </a:ext>
-            </a:extLst>
-          </p:cNvPr>
-          <p:cNvSpPr>
-            <a:spLocks noGrp="1"/>
-          </p:cNvSpPr>
-          <p:nvPr>
-            <p:ph type="title"/>
-          </p:nvPr>
-        </p:nvSpPr>
-        <p:spPr>
-          <a:xfrm>
-            <a:off x="1047280" y="788894"/>
-            <a:ext cx="10306520" cy="880730"/>
-          </a:xfrm>
-        </p:spPr>
-        <p:txBody>
-          <a:bodyPr>
-            <a:normAutofit/>
-          </a:bodyPr>
-          <a:lstStyle/>
-          <a:p>
-            <a:pPr marL="0" marR="0">
-              <a:spcBef>
-                <a:spcPts val="0"/>
-              </a:spcBef>
-              <a:spcAft>
-                <a:spcPts val="800"/>
-              </a:spcAft>
-            </a:pPr>
-            <a:r>
-              <a:rPr lang="en-US" sz="4000" dirty="0">
-                <a:solidFill>
-                  <a:srgbClr val="FFFFFF"/>
-                </a:solidFill>
-                <a:latin typeface="Calibri" panose="020F0502020204030204" pitchFamily="34" charset="0"/>
-                <a:ea typeface="Calibri" panose="020F0502020204030204" pitchFamily="34" charset="0"/>
-                <a:cs typeface="Times New Roman" panose="02020603050405020304" pitchFamily="18" charset="0"/>
-              </a:rPr>
-              <a:t>EDA</a:t>
-            </a:r>
-            <a:endParaRPr lang="en-US" sz="4000" dirty="0">
-              <a:solidFill>
-                <a:srgbClr val="FFFFFF"/>
-              </a:solidFill>
-              <a:effectLst/>
-              <a:latin typeface="Calibri" panose="020F0502020204030204" pitchFamily="34" charset="0"/>
-              <a:ea typeface="Calibri" panose="020F0502020204030204" pitchFamily="34" charset="0"/>
-              <a:cs typeface="Times New Roman" panose="02020603050405020304" pitchFamily="18" charset="0"/>
-            </a:endParaRPr>
-          </a:p>
-        </p:txBody>
-      </p:sp>
-      <p:pic>
-        <p:nvPicPr>
-          <p:cNvPr id="10" name="Content Placeholder 7" descr="Chart, bar chart&#10;&#10;Description automatically generated">
-            <a:extLst>
-              <a:ext uri="{FF2B5EF4-FFF2-40B4-BE49-F238E27FC236}">
-                <a16:creationId xmlns:a16="http://schemas.microsoft.com/office/drawing/2014/main" id="{52AD2B3D-73BD-4999-BF02-037C93712C47}"/>
-              </a:ext>
-            </a:extLst>
-          </p:cNvPr>
-          <p:cNvPicPr>
-            <a:picLocks noChangeAspect="1"/>
-          </p:cNvPicPr>
-          <p:nvPr/>
-        </p:nvPicPr>
-        <p:blipFill>
-          <a:blip r:embed="rId2">
-            <a:extLst>
-              <a:ext uri="{28A0092B-C50C-407E-A947-70E740481C1C}">
-                <a14:useLocalDpi xmlns:a14="http://schemas.microsoft.com/office/drawing/2010/main" val="0"/>
-              </a:ext>
-            </a:extLst>
-          </a:blip>
-          <a:stretch>
-            <a:fillRect/>
-          </a:stretch>
-        </p:blipFill>
-        <p:spPr>
-          <a:xfrm>
-            <a:off x="812935" y="1870947"/>
-            <a:ext cx="5411540" cy="4776160"/>
-          </a:xfrm>
-          <a:prstGeom prst="rect">
-            <a:avLst/>
-          </a:prstGeom>
-        </p:spPr>
-      </p:pic>
-      <p:pic>
-        <p:nvPicPr>
-          <p:cNvPr id="11" name="Content Placeholder 10" descr="Chart, bar chart&#10;&#10;Description automatically generated">
-            <a:extLst>
-              <a:ext uri="{FF2B5EF4-FFF2-40B4-BE49-F238E27FC236}">
-                <a16:creationId xmlns:a16="http://schemas.microsoft.com/office/drawing/2014/main" id="{0485A0D8-FA58-4347-852C-36DA27E58F3A}"/>
-              </a:ext>
-            </a:extLst>
-          </p:cNvPr>
-          <p:cNvPicPr>
-            <a:picLocks noGrp="1" noChangeAspect="1"/>
-          </p:cNvPicPr>
-          <p:nvPr>
-            <p:ph idx="1"/>
-          </p:nvPr>
-        </p:nvPicPr>
-        <p:blipFill>
-          <a:blip r:embed="rId3">
-            <a:extLst>
-              <a:ext uri="{28A0092B-C50C-407E-A947-70E740481C1C}">
-                <a14:useLocalDpi xmlns:a14="http://schemas.microsoft.com/office/drawing/2010/main" val="0"/>
-              </a:ext>
-            </a:extLst>
-          </a:blip>
-          <a:stretch>
-            <a:fillRect/>
-          </a:stretch>
-        </p:blipFill>
-        <p:spPr>
-          <a:xfrm>
-            <a:off x="6556074" y="1929561"/>
-            <a:ext cx="5345128" cy="4717546"/>
-          </a:xfrm>
-          <a:prstGeom prst="rect">
-            <a:avLst/>
-          </a:prstGeom>
-        </p:spPr>
-      </p:pic>
-    </p:spTree>
-    <p:extLst>
-      <p:ext uri="{BB962C8B-B14F-4D97-AF65-F5344CB8AC3E}">
-        <p14:creationId xmlns:p14="http://schemas.microsoft.com/office/powerpoint/2010/main" val="2601121395"/>
-      </p:ext>
-    </p:extLst>
-  </p:cSld>
-  <p:clrMapOvr>
-    <a:masterClrMapping/>
-  </p:clrMapOvr>
-</p:sld>
-</file>
-
-<file path=ppt/slides/slide8.xml><?xml version="1.0" encoding="utf-8"?>
 <p:sld xmlns:a="http://schemas.openxmlformats.org/drawingml/2006/main" xmlns:r="http://schemas.openxmlformats.org/officeDocument/2006/relationships" xmlns:p="http://schemas.openxmlformats.org/presentationml/2006/main">
   <p:cSld>
     <p:bg>
@@ -14919,7 +13570,7 @@
 </p:sld>
 </file>
 
-<file path=ppt/slides/slide9.xml><?xml version="1.0" encoding="utf-8"?>
+<file path=ppt/slides/slide8.xml><?xml version="1.0" encoding="utf-8"?>
 <p:sld xmlns:a="http://schemas.openxmlformats.org/drawingml/2006/main" xmlns:r="http://schemas.openxmlformats.org/officeDocument/2006/relationships" xmlns:p="http://schemas.openxmlformats.org/presentationml/2006/main">
   <p:cSld>
     <p:bg>
@@ -15773,6 +14424,880 @@
 </p:sld>
 </file>
 
+<file path=ppt/slides/slide9.xml><?xml version="1.0" encoding="utf-8"?>
+<p:sld xmlns:a="http://schemas.openxmlformats.org/drawingml/2006/main" xmlns:r="http://schemas.openxmlformats.org/officeDocument/2006/relationships" xmlns:p="http://schemas.openxmlformats.org/presentationml/2006/main">
+  <p:cSld>
+    <p:bg>
+      <p:bgPr>
+        <a:solidFill>
+          <a:schemeClr val="bg1"/>
+        </a:solidFill>
+        <a:effectLst/>
+      </p:bgPr>
+    </p:bg>
+    <p:spTree>
+      <p:nvGrpSpPr>
+        <p:cNvPr id="1" name=""/>
+        <p:cNvGrpSpPr/>
+        <p:nvPr/>
+      </p:nvGrpSpPr>
+      <p:grpSpPr>
+        <a:xfrm>
+          <a:off x="0" y="0"/>
+          <a:ext cx="0" cy="0"/>
+          <a:chOff x="0" y="0"/>
+          <a:chExt cx="0" cy="0"/>
+        </a:xfrm>
+      </p:grpSpPr>
+      <p:sp useBgFill="1">
+        <p:nvSpPr>
+          <p:cNvPr id="38" name="Rectangle 37">
+            <a:extLst>
+              <a:ext uri="{FF2B5EF4-FFF2-40B4-BE49-F238E27FC236}">
+                <a16:creationId xmlns:a16="http://schemas.microsoft.com/office/drawing/2014/main" id="{911A6C77-6109-4F77-975B-C375615A557E}"/>
+              </a:ext>
+              <a:ext uri="{C183D7F6-B498-43B3-948B-1728B52AA6E4}">
+                <adec:decorative xmlns:adec="http://schemas.microsoft.com/office/drawing/2017/decorative" val="1"/>
+              </a:ext>
+            </a:extLst>
+          </p:cNvPr>
+          <p:cNvSpPr>
+            <a:spLocks noGrp="1" noRot="1" noChangeAspect="1" noMove="1" noResize="1" noEditPoints="1" noAdjustHandles="1" noChangeArrowheads="1" noChangeShapeType="1" noTextEdit="1"/>
+          </p:cNvSpPr>
+          <p:nvPr>
+            <p:extLst>
+              <p:ext uri="{386F3935-93C4-4BCD-93E2-E3B085C9AB24}">
+                <p16:designElem xmlns:p16="http://schemas.microsoft.com/office/powerpoint/2015/main" val="1"/>
+              </p:ext>
+            </p:extLst>
+          </p:nvPr>
+        </p:nvSpPr>
+        <p:spPr>
+          <a:xfrm>
+            <a:off x="0" y="0"/>
+            <a:ext cx="12188952" cy="6858000"/>
+          </a:xfrm>
+          <a:prstGeom prst="rect">
+            <a:avLst/>
+          </a:prstGeom>
+          <a:ln>
+            <a:noFill/>
+          </a:ln>
+        </p:spPr>
+        <p:style>
+          <a:lnRef idx="2">
+            <a:schemeClr val="accent1">
+              <a:shade val="50000"/>
+            </a:schemeClr>
+          </a:lnRef>
+          <a:fillRef idx="1">
+            <a:schemeClr val="accent1"/>
+          </a:fillRef>
+          <a:effectRef idx="0">
+            <a:schemeClr val="accent1"/>
+          </a:effectRef>
+          <a:fontRef idx="minor">
+            <a:schemeClr val="lt1"/>
+          </a:fontRef>
+        </p:style>
+        <p:txBody>
+          <a:bodyPr rtlCol="0" anchor="ctr"/>
+          <a:lstStyle/>
+          <a:p>
+            <a:pPr algn="ctr"/>
+            <a:endParaRPr lang="en-US"/>
+          </a:p>
+        </p:txBody>
+      </p:sp>
+      <p:grpSp>
+        <p:nvGrpSpPr>
+          <p:cNvPr id="40" name="Group 39">
+            <a:extLst>
+              <a:ext uri="{FF2B5EF4-FFF2-40B4-BE49-F238E27FC236}">
+                <a16:creationId xmlns:a16="http://schemas.microsoft.com/office/drawing/2014/main" id="{CB343D17-9934-455E-B326-2F39206BA44A}"/>
+              </a:ext>
+              <a:ext uri="{C183D7F6-B498-43B3-948B-1728B52AA6E4}">
+                <adec:decorative xmlns:adec="http://schemas.microsoft.com/office/drawing/2017/decorative" val="1"/>
+              </a:ext>
+            </a:extLst>
+          </p:cNvPr>
+          <p:cNvGrpSpPr>
+            <a:grpSpLocks noGrp="1" noUngrp="1" noRot="1" noChangeAspect="1" noMove="1" noResize="1"/>
+          </p:cNvGrpSpPr>
+          <p:nvPr>
+            <p:extLst>
+              <p:ext uri="{386F3935-93C4-4BCD-93E2-E3B085C9AB24}">
+                <p16:designElem xmlns:p16="http://schemas.microsoft.com/office/powerpoint/2015/main" val="1"/>
+              </p:ext>
+            </p:extLst>
+          </p:nvPr>
+        </p:nvGrpSpPr>
+        <p:grpSpPr>
+          <a:xfrm>
+            <a:off x="409710" y="635715"/>
+            <a:ext cx="11142208" cy="2482136"/>
+            <a:chOff x="409710" y="635715"/>
+            <a:chExt cx="11142208" cy="2482136"/>
+          </a:xfrm>
+        </p:grpSpPr>
+        <p:sp>
+          <p:nvSpPr>
+            <p:cNvPr id="41" name="Freeform 44">
+              <a:extLst>
+                <a:ext uri="{FF2B5EF4-FFF2-40B4-BE49-F238E27FC236}">
+                  <a16:creationId xmlns:a16="http://schemas.microsoft.com/office/drawing/2014/main" id="{A8AA2B63-BFCD-40D0-B2D0-CB714D70E2E4}"/>
+                </a:ext>
+                <a:ext uri="{C183D7F6-B498-43B3-948B-1728B52AA6E4}">
+                  <adec:decorative xmlns:adec="http://schemas.microsoft.com/office/drawing/2017/decorative" val="1"/>
+                </a:ext>
+              </a:extLst>
+            </p:cNvPr>
+            <p:cNvSpPr>
+              <a:spLocks/>
+            </p:cNvSpPr>
+            <p:nvPr>
+              <p:extLst>
+                <p:ext uri="{386F3935-93C4-4BCD-93E2-E3B085C9AB24}">
+                  <p16:designElem xmlns:p16="http://schemas.microsoft.com/office/powerpoint/2015/main" val="1"/>
+                </p:ext>
+              </p:extLst>
+            </p:nvPr>
+          </p:nvSpPr>
+          <p:spPr bwMode="auto">
+            <a:xfrm>
+              <a:off x="11223203" y="635716"/>
+              <a:ext cx="328612" cy="1742360"/>
+            </a:xfrm>
+            <a:custGeom>
+              <a:avLst/>
+              <a:gdLst>
+                <a:gd name="T0" fmla="*/ 207 w 207"/>
+                <a:gd name="T1" fmla="*/ 987 h 1114"/>
+                <a:gd name="T2" fmla="*/ 0 w 207"/>
+                <a:gd name="T3" fmla="*/ 1114 h 1114"/>
+                <a:gd name="T4" fmla="*/ 0 w 207"/>
+                <a:gd name="T5" fmla="*/ 127 h 1114"/>
+                <a:gd name="T6" fmla="*/ 207 w 207"/>
+                <a:gd name="T7" fmla="*/ 0 h 1114"/>
+                <a:gd name="T8" fmla="*/ 207 w 207"/>
+                <a:gd name="T9" fmla="*/ 987 h 1114"/>
+              </a:gdLst>
+              <a:ahLst/>
+              <a:cxnLst>
+                <a:cxn ang="0">
+                  <a:pos x="T0" y="T1"/>
+                </a:cxn>
+                <a:cxn ang="0">
+                  <a:pos x="T2" y="T3"/>
+                </a:cxn>
+                <a:cxn ang="0">
+                  <a:pos x="T4" y="T5"/>
+                </a:cxn>
+                <a:cxn ang="0">
+                  <a:pos x="T6" y="T7"/>
+                </a:cxn>
+                <a:cxn ang="0">
+                  <a:pos x="T8" y="T9"/>
+                </a:cxn>
+              </a:cxnLst>
+              <a:rect l="0" t="0" r="r" b="b"/>
+              <a:pathLst>
+                <a:path w="207" h="1114">
+                  <a:moveTo>
+                    <a:pt x="207" y="987"/>
+                  </a:moveTo>
+                  <a:lnTo>
+                    <a:pt x="0" y="1114"/>
+                  </a:lnTo>
+                  <a:lnTo>
+                    <a:pt x="0" y="127"/>
+                  </a:lnTo>
+                  <a:lnTo>
+                    <a:pt x="207" y="0"/>
+                  </a:lnTo>
+                  <a:lnTo>
+                    <a:pt x="207" y="987"/>
+                  </a:lnTo>
+                  <a:close/>
+                </a:path>
+              </a:pathLst>
+            </a:custGeom>
+            <a:solidFill>
+              <a:schemeClr val="accent1">
+                <a:lumMod val="50000"/>
+              </a:schemeClr>
+            </a:solidFill>
+            <a:ln>
+              <a:noFill/>
+            </a:ln>
+          </p:spPr>
+          <p:txBody>
+            <a:bodyPr vert="horz" wrap="square" lIns="91440" tIns="45720" rIns="91440" bIns="45720" numCol="1" anchor="t" anchorCtr="0" compatLnSpc="1">
+              <a:prstTxWarp prst="textNoShape">
+                <a:avLst/>
+              </a:prstTxWarp>
+            </a:bodyPr>
+            <a:lstStyle/>
+            <a:p>
+              <a:endParaRPr lang="en-US"/>
+            </a:p>
+          </p:txBody>
+        </p:sp>
+        <p:sp>
+          <p:nvSpPr>
+            <p:cNvPr id="42" name="Freeform 45">
+              <a:extLst>
+                <a:ext uri="{FF2B5EF4-FFF2-40B4-BE49-F238E27FC236}">
+                  <a16:creationId xmlns:a16="http://schemas.microsoft.com/office/drawing/2014/main" id="{80834EBB-06EA-4C69-AF7A-D5A4E69D8A83}"/>
+                </a:ext>
+                <a:ext uri="{C183D7F6-B498-43B3-948B-1728B52AA6E4}">
+                  <adec:decorative xmlns:adec="http://schemas.microsoft.com/office/drawing/2017/decorative" val="1"/>
+                </a:ext>
+              </a:extLst>
+            </p:cNvPr>
+            <p:cNvSpPr>
+              <a:spLocks/>
+            </p:cNvSpPr>
+            <p:nvPr>
+              <p:extLst>
+                <p:ext uri="{386F3935-93C4-4BCD-93E2-E3B085C9AB24}">
+                  <p16:designElem xmlns:p16="http://schemas.microsoft.com/office/powerpoint/2015/main" val="1"/>
+                </p:ext>
+              </p:extLst>
+            </p:nvPr>
+          </p:nvSpPr>
+          <p:spPr bwMode="auto">
+            <a:xfrm>
+              <a:off x="409710" y="1022350"/>
+              <a:ext cx="709612" cy="2095501"/>
+            </a:xfrm>
+            <a:custGeom>
+              <a:avLst/>
+              <a:gdLst>
+                <a:gd name="T0" fmla="*/ 447 w 447"/>
+                <a:gd name="T1" fmla="*/ 1363 h 1363"/>
+                <a:gd name="T2" fmla="*/ 0 w 447"/>
+                <a:gd name="T3" fmla="*/ 987 h 1363"/>
+                <a:gd name="T4" fmla="*/ 0 w 447"/>
+                <a:gd name="T5" fmla="*/ 0 h 1363"/>
+                <a:gd name="T6" fmla="*/ 447 w 447"/>
+                <a:gd name="T7" fmla="*/ 376 h 1363"/>
+                <a:gd name="T8" fmla="*/ 447 w 447"/>
+                <a:gd name="T9" fmla="*/ 1363 h 1363"/>
+              </a:gdLst>
+              <a:ahLst/>
+              <a:cxnLst>
+                <a:cxn ang="0">
+                  <a:pos x="T0" y="T1"/>
+                </a:cxn>
+                <a:cxn ang="0">
+                  <a:pos x="T2" y="T3"/>
+                </a:cxn>
+                <a:cxn ang="0">
+                  <a:pos x="T4" y="T5"/>
+                </a:cxn>
+                <a:cxn ang="0">
+                  <a:pos x="T6" y="T7"/>
+                </a:cxn>
+                <a:cxn ang="0">
+                  <a:pos x="T8" y="T9"/>
+                </a:cxn>
+              </a:cxnLst>
+              <a:rect l="0" t="0" r="r" b="b"/>
+              <a:pathLst>
+                <a:path w="447" h="1363">
+                  <a:moveTo>
+                    <a:pt x="447" y="1363"/>
+                  </a:moveTo>
+                  <a:lnTo>
+                    <a:pt x="0" y="987"/>
+                  </a:lnTo>
+                  <a:lnTo>
+                    <a:pt x="0" y="0"/>
+                  </a:lnTo>
+                  <a:lnTo>
+                    <a:pt x="447" y="376"/>
+                  </a:lnTo>
+                  <a:lnTo>
+                    <a:pt x="447" y="1363"/>
+                  </a:lnTo>
+                  <a:close/>
+                </a:path>
+              </a:pathLst>
+            </a:custGeom>
+            <a:solidFill>
+              <a:schemeClr val="accent1">
+                <a:lumMod val="50000"/>
+              </a:schemeClr>
+            </a:solidFill>
+            <a:ln>
+              <a:noFill/>
+            </a:ln>
+          </p:spPr>
+          <p:txBody>
+            <a:bodyPr vert="horz" wrap="square" lIns="91440" tIns="45720" rIns="91440" bIns="45720" numCol="1" anchor="t" anchorCtr="0" compatLnSpc="1">
+              <a:prstTxWarp prst="textNoShape">
+                <a:avLst/>
+              </a:prstTxWarp>
+            </a:bodyPr>
+            <a:lstStyle/>
+            <a:p>
+              <a:endParaRPr lang="en-US"/>
+            </a:p>
+          </p:txBody>
+        </p:sp>
+        <p:sp>
+          <p:nvSpPr>
+            <p:cNvPr id="43" name="Freeform 46">
+              <a:extLst>
+                <a:ext uri="{FF2B5EF4-FFF2-40B4-BE49-F238E27FC236}">
+                  <a16:creationId xmlns:a16="http://schemas.microsoft.com/office/drawing/2014/main" id="{2D314EC1-63E0-43B5-9CD5-F25593B2CA39}"/>
+                </a:ext>
+                <a:ext uri="{C183D7F6-B498-43B3-948B-1728B52AA6E4}">
+                  <adec:decorative xmlns:adec="http://schemas.microsoft.com/office/drawing/2017/decorative" val="1"/>
+                </a:ext>
+              </a:extLst>
+            </p:cNvPr>
+            <p:cNvSpPr>
+              <a:spLocks/>
+            </p:cNvSpPr>
+            <p:nvPr>
+              <p:extLst>
+                <p:ext uri="{386F3935-93C4-4BCD-93E2-E3B085C9AB24}">
+                  <p16:designElem xmlns:p16="http://schemas.microsoft.com/office/powerpoint/2015/main" val="1"/>
+                </p:ext>
+              </p:extLst>
+            </p:nvPr>
+          </p:nvSpPr>
+          <p:spPr bwMode="auto">
+            <a:xfrm>
+              <a:off x="409710" y="837744"/>
+              <a:ext cx="403225" cy="1705431"/>
+            </a:xfrm>
+            <a:custGeom>
+              <a:avLst/>
+              <a:gdLst>
+                <a:gd name="T0" fmla="*/ 254 w 254"/>
+                <a:gd name="T1" fmla="*/ 987 h 1109"/>
+                <a:gd name="T2" fmla="*/ 0 w 254"/>
+                <a:gd name="T3" fmla="*/ 1109 h 1109"/>
+                <a:gd name="T4" fmla="*/ 0 w 254"/>
+                <a:gd name="T5" fmla="*/ 119 h 1109"/>
+                <a:gd name="T6" fmla="*/ 254 w 254"/>
+                <a:gd name="T7" fmla="*/ 0 h 1109"/>
+                <a:gd name="T8" fmla="*/ 254 w 254"/>
+                <a:gd name="T9" fmla="*/ 987 h 1109"/>
+              </a:gdLst>
+              <a:ahLst/>
+              <a:cxnLst>
+                <a:cxn ang="0">
+                  <a:pos x="T0" y="T1"/>
+                </a:cxn>
+                <a:cxn ang="0">
+                  <a:pos x="T2" y="T3"/>
+                </a:cxn>
+                <a:cxn ang="0">
+                  <a:pos x="T4" y="T5"/>
+                </a:cxn>
+                <a:cxn ang="0">
+                  <a:pos x="T6" y="T7"/>
+                </a:cxn>
+                <a:cxn ang="0">
+                  <a:pos x="T8" y="T9"/>
+                </a:cxn>
+              </a:cxnLst>
+              <a:rect l="0" t="0" r="r" b="b"/>
+              <a:pathLst>
+                <a:path w="254" h="1109">
+                  <a:moveTo>
+                    <a:pt x="254" y="987"/>
+                  </a:moveTo>
+                  <a:lnTo>
+                    <a:pt x="0" y="1109"/>
+                  </a:lnTo>
+                  <a:lnTo>
+                    <a:pt x="0" y="119"/>
+                  </a:lnTo>
+                  <a:lnTo>
+                    <a:pt x="254" y="0"/>
+                  </a:lnTo>
+                  <a:lnTo>
+                    <a:pt x="254" y="987"/>
+                  </a:lnTo>
+                  <a:close/>
+                </a:path>
+              </a:pathLst>
+            </a:custGeom>
+            <a:solidFill>
+              <a:schemeClr val="accent1">
+                <a:lumMod val="75000"/>
+              </a:schemeClr>
+            </a:solidFill>
+            <a:ln>
+              <a:noFill/>
+            </a:ln>
+          </p:spPr>
+          <p:txBody>
+            <a:bodyPr vert="horz" wrap="square" lIns="91440" tIns="45720" rIns="91440" bIns="45720" numCol="1" anchor="t" anchorCtr="0" compatLnSpc="1">
+              <a:prstTxWarp prst="textNoShape">
+                <a:avLst/>
+              </a:prstTxWarp>
+            </a:bodyPr>
+            <a:lstStyle/>
+            <a:p>
+              <a:endParaRPr lang="en-US"/>
+            </a:p>
+          </p:txBody>
+        </p:sp>
+        <p:sp>
+          <p:nvSpPr>
+            <p:cNvPr id="44" name="Freeform 47">
+              <a:extLst>
+                <a:ext uri="{FF2B5EF4-FFF2-40B4-BE49-F238E27FC236}">
+                  <a16:creationId xmlns:a16="http://schemas.microsoft.com/office/drawing/2014/main" id="{9577EB7D-16A7-4E05-9105-431E729665F5}"/>
+                </a:ext>
+                <a:ext uri="{C183D7F6-B498-43B3-948B-1728B52AA6E4}">
+                  <adec:decorative xmlns:adec="http://schemas.microsoft.com/office/drawing/2017/decorative" val="1"/>
+                </a:ext>
+              </a:extLst>
+            </p:cNvPr>
+            <p:cNvSpPr>
+              <a:spLocks/>
+            </p:cNvSpPr>
+            <p:nvPr>
+              <p:extLst>
+                <p:ext uri="{386F3935-93C4-4BCD-93E2-E3B085C9AB24}">
+                  <p16:designElem xmlns:p16="http://schemas.microsoft.com/office/powerpoint/2015/main" val="1"/>
+                </p:ext>
+              </p:extLst>
+            </p:nvPr>
+          </p:nvSpPr>
+          <p:spPr bwMode="auto">
+            <a:xfrm>
+              <a:off x="644660" y="640894"/>
+              <a:ext cx="168275" cy="1713195"/>
+            </a:xfrm>
+            <a:custGeom>
+              <a:avLst/>
+              <a:gdLst>
+                <a:gd name="T0" fmla="*/ 106 w 106"/>
+                <a:gd name="T1" fmla="*/ 1114 h 1114"/>
+                <a:gd name="T2" fmla="*/ 0 w 106"/>
+                <a:gd name="T3" fmla="*/ 1005 h 1114"/>
+                <a:gd name="T4" fmla="*/ 0 w 106"/>
+                <a:gd name="T5" fmla="*/ 0 h 1114"/>
+                <a:gd name="T6" fmla="*/ 106 w 106"/>
+                <a:gd name="T7" fmla="*/ 110 h 1114"/>
+                <a:gd name="T8" fmla="*/ 106 w 106"/>
+                <a:gd name="T9" fmla="*/ 1114 h 1114"/>
+              </a:gdLst>
+              <a:ahLst/>
+              <a:cxnLst>
+                <a:cxn ang="0">
+                  <a:pos x="T0" y="T1"/>
+                </a:cxn>
+                <a:cxn ang="0">
+                  <a:pos x="T2" y="T3"/>
+                </a:cxn>
+                <a:cxn ang="0">
+                  <a:pos x="T4" y="T5"/>
+                </a:cxn>
+                <a:cxn ang="0">
+                  <a:pos x="T6" y="T7"/>
+                </a:cxn>
+                <a:cxn ang="0">
+                  <a:pos x="T8" y="T9"/>
+                </a:cxn>
+              </a:cxnLst>
+              <a:rect l="0" t="0" r="r" b="b"/>
+              <a:pathLst>
+                <a:path w="106" h="1114">
+                  <a:moveTo>
+                    <a:pt x="106" y="1114"/>
+                  </a:moveTo>
+                  <a:lnTo>
+                    <a:pt x="0" y="1005"/>
+                  </a:lnTo>
+                  <a:lnTo>
+                    <a:pt x="0" y="0"/>
+                  </a:lnTo>
+                  <a:lnTo>
+                    <a:pt x="106" y="110"/>
+                  </a:lnTo>
+                  <a:lnTo>
+                    <a:pt x="106" y="1114"/>
+                  </a:lnTo>
+                  <a:close/>
+                </a:path>
+              </a:pathLst>
+            </a:custGeom>
+            <a:solidFill>
+              <a:schemeClr val="accent1">
+                <a:lumMod val="50000"/>
+              </a:schemeClr>
+            </a:solidFill>
+            <a:ln>
+              <a:noFill/>
+            </a:ln>
+          </p:spPr>
+          <p:txBody>
+            <a:bodyPr vert="horz" wrap="square" lIns="91440" tIns="45720" rIns="91440" bIns="45720" numCol="1" anchor="t" anchorCtr="0" compatLnSpc="1">
+              <a:prstTxWarp prst="textNoShape">
+                <a:avLst/>
+              </a:prstTxWarp>
+            </a:bodyPr>
+            <a:lstStyle/>
+            <a:p>
+              <a:endParaRPr lang="en-US"/>
+            </a:p>
+          </p:txBody>
+        </p:sp>
+        <p:sp>
+          <p:nvSpPr>
+            <p:cNvPr id="45" name="Rectangle 44">
+              <a:extLst>
+                <a:ext uri="{FF2B5EF4-FFF2-40B4-BE49-F238E27FC236}">
+                  <a16:creationId xmlns:a16="http://schemas.microsoft.com/office/drawing/2014/main" id="{EC1741C3-592F-47B5-93A0-66FC0BB97E49}"/>
+                </a:ext>
+                <a:ext uri="{C183D7F6-B498-43B3-948B-1728B52AA6E4}">
+                  <adec:decorative xmlns:adec="http://schemas.microsoft.com/office/drawing/2017/decorative" val="1"/>
+                </a:ext>
+              </a:extLst>
+            </p:cNvPr>
+            <p:cNvSpPr>
+              <a:spLocks noChangeArrowheads="1"/>
+            </p:cNvSpPr>
+            <p:nvPr>
+              <p:extLst>
+                <p:ext uri="{386F3935-93C4-4BCD-93E2-E3B085C9AB24}">
+                  <p16:designElem xmlns:p16="http://schemas.microsoft.com/office/powerpoint/2015/main" val="1"/>
+                </p:ext>
+              </p:extLst>
+            </p:nvPr>
+          </p:nvSpPr>
+          <p:spPr bwMode="auto">
+            <a:xfrm>
+              <a:off x="644055" y="635715"/>
+              <a:ext cx="10907863" cy="1541457"/>
+            </a:xfrm>
+            <a:prstGeom prst="rect">
+              <a:avLst/>
+            </a:prstGeom>
+            <a:solidFill>
+              <a:schemeClr val="accent1"/>
+            </a:solidFill>
+            <a:ln>
+              <a:noFill/>
+            </a:ln>
+          </p:spPr>
+          <p:txBody>
+            <a:bodyPr vert="horz" wrap="square" lIns="91440" tIns="45720" rIns="91440" bIns="45720" numCol="1" anchor="t" anchorCtr="0" compatLnSpc="1">
+              <a:prstTxWarp prst="textNoShape">
+                <a:avLst/>
+              </a:prstTxWarp>
+            </a:bodyPr>
+            <a:lstStyle/>
+            <a:p>
+              <a:endParaRPr lang="en-US"/>
+            </a:p>
+          </p:txBody>
+        </p:sp>
+      </p:grpSp>
+      <p:sp>
+        <p:nvSpPr>
+          <p:cNvPr id="2" name="Title 1">
+            <a:extLst>
+              <a:ext uri="{FF2B5EF4-FFF2-40B4-BE49-F238E27FC236}">
+                <a16:creationId xmlns:a16="http://schemas.microsoft.com/office/drawing/2014/main" id="{424E4552-B777-4187-8FD3-061EA04D4793}"/>
+              </a:ext>
+            </a:extLst>
+          </p:cNvPr>
+          <p:cNvSpPr>
+            <a:spLocks noGrp="1"/>
+          </p:cNvSpPr>
+          <p:nvPr>
+            <p:ph type="title"/>
+          </p:nvPr>
+        </p:nvSpPr>
+        <p:spPr>
+          <a:xfrm>
+            <a:off x="1047280" y="759805"/>
+            <a:ext cx="10306520" cy="1325563"/>
+          </a:xfrm>
+        </p:spPr>
+        <p:txBody>
+          <a:bodyPr>
+            <a:normAutofit/>
+          </a:bodyPr>
+          <a:lstStyle/>
+          <a:p>
+            <a:pPr marL="0" marR="0">
+              <a:spcBef>
+                <a:spcPts val="0"/>
+              </a:spcBef>
+              <a:spcAft>
+                <a:spcPts val="800"/>
+              </a:spcAft>
+            </a:pPr>
+            <a:r>
+              <a:rPr lang="en-US" sz="4000">
+                <a:solidFill>
+                  <a:srgbClr val="FFFFFF"/>
+                </a:solidFill>
+                <a:effectLst/>
+                <a:latin typeface="Calibri" panose="020F0502020204030204" pitchFamily="34" charset="0"/>
+                <a:ea typeface="Calibri" panose="020F0502020204030204" pitchFamily="34" charset="0"/>
+                <a:cs typeface="Times New Roman" panose="02020603050405020304" pitchFamily="18" charset="0"/>
+              </a:rPr>
+              <a:t>Modeling </a:t>
+            </a:r>
+            <a:br>
+              <a:rPr lang="en-US" sz="4000">
+                <a:solidFill>
+                  <a:srgbClr val="FFFFFF"/>
+                </a:solidFill>
+                <a:effectLst/>
+                <a:latin typeface="Calibri" panose="020F0502020204030204" pitchFamily="34" charset="0"/>
+                <a:ea typeface="Calibri" panose="020F0502020204030204" pitchFamily="34" charset="0"/>
+                <a:cs typeface="Times New Roman" panose="02020603050405020304" pitchFamily="18" charset="0"/>
+              </a:rPr>
+            </a:br>
+            <a:r>
+              <a:rPr lang="en-US" sz="4000">
+                <a:solidFill>
+                  <a:srgbClr val="FFFFFF"/>
+                </a:solidFill>
+                <a:effectLst/>
+                <a:latin typeface="Calibri" panose="020F0502020204030204" pitchFamily="34" charset="0"/>
+                <a:ea typeface="Calibri" panose="020F0502020204030204" pitchFamily="34" charset="0"/>
+                <a:cs typeface="Times New Roman" panose="02020603050405020304" pitchFamily="18" charset="0"/>
+              </a:rPr>
+              <a:t>Yes vs </a:t>
+            </a:r>
+            <a:r>
+              <a:rPr lang="en-US" sz="4000">
+                <a:solidFill>
+                  <a:srgbClr val="FFFFFF"/>
+                </a:solidFill>
+                <a:latin typeface="Calibri" panose="020F0502020204030204" pitchFamily="34" charset="0"/>
+                <a:ea typeface="Calibri" panose="020F0502020204030204" pitchFamily="34" charset="0"/>
+                <a:cs typeface="Times New Roman" panose="02020603050405020304" pitchFamily="18" charset="0"/>
+              </a:rPr>
+              <a:t>No</a:t>
+            </a:r>
+            <a:endParaRPr lang="en-US" sz="4000">
+              <a:solidFill>
+                <a:srgbClr val="FFFFFF"/>
+              </a:solidFill>
+              <a:effectLst/>
+              <a:latin typeface="Calibri" panose="020F0502020204030204" pitchFamily="34" charset="0"/>
+              <a:ea typeface="Calibri" panose="020F0502020204030204" pitchFamily="34" charset="0"/>
+              <a:cs typeface="Times New Roman" panose="02020603050405020304" pitchFamily="18" charset="0"/>
+            </a:endParaRPr>
+          </a:p>
+        </p:txBody>
+      </p:sp>
+      <p:pic>
+        <p:nvPicPr>
+          <p:cNvPr id="8" name="Content Placeholder 10" descr="Chart, bar chart&#10;&#10;Description automatically generated">
+            <a:extLst>
+              <a:ext uri="{FF2B5EF4-FFF2-40B4-BE49-F238E27FC236}">
+                <a16:creationId xmlns:a16="http://schemas.microsoft.com/office/drawing/2014/main" id="{FD233703-6663-4C7B-8817-83FF3DDBB437}"/>
+              </a:ext>
+            </a:extLst>
+          </p:cNvPr>
+          <p:cNvPicPr>
+            <a:picLocks noChangeAspect="1"/>
+          </p:cNvPicPr>
+          <p:nvPr/>
+        </p:nvPicPr>
+        <p:blipFill rotWithShape="1">
+          <a:blip r:embed="rId2">
+            <a:extLst>
+              <a:ext uri="{28A0092B-C50C-407E-A947-70E740481C1C}">
+                <a14:useLocalDpi xmlns:a14="http://schemas.microsoft.com/office/drawing/2010/main" val="0"/>
+              </a:ext>
+            </a:extLst>
+          </a:blip>
+          <a:srcRect l="18885" r="1626" b="5"/>
+          <a:stretch/>
+        </p:blipFill>
+        <p:spPr>
+          <a:xfrm>
+            <a:off x="1119322" y="2177171"/>
+            <a:ext cx="4490271" cy="4321811"/>
+          </a:xfrm>
+          <a:prstGeom prst="rect">
+            <a:avLst/>
+          </a:prstGeom>
+        </p:spPr>
+      </p:pic>
+      <p:sp>
+        <p:nvSpPr>
+          <p:cNvPr id="3" name="Content Placeholder 2">
+            <a:extLst>
+              <a:ext uri="{FF2B5EF4-FFF2-40B4-BE49-F238E27FC236}">
+                <a16:creationId xmlns:a16="http://schemas.microsoft.com/office/drawing/2014/main" id="{1AC994BF-ABF2-4936-BB7B-56B14404FF6D}"/>
+              </a:ext>
+            </a:extLst>
+          </p:cNvPr>
+          <p:cNvSpPr>
+            <a:spLocks noGrp="1"/>
+          </p:cNvSpPr>
+          <p:nvPr>
+            <p:ph idx="1"/>
+          </p:nvPr>
+        </p:nvSpPr>
+        <p:spPr>
+          <a:xfrm>
+            <a:off x="5915980" y="2177171"/>
+            <a:ext cx="5631360" cy="4256285"/>
+          </a:xfrm>
+        </p:spPr>
+        <p:txBody>
+          <a:bodyPr>
+            <a:noAutofit/>
+          </a:bodyPr>
+          <a:lstStyle/>
+          <a:p>
+            <a:pPr marL="0" marR="0" indent="0">
+              <a:spcBef>
+                <a:spcPts val="0"/>
+              </a:spcBef>
+              <a:spcAft>
+                <a:spcPts val="800"/>
+              </a:spcAft>
+              <a:buNone/>
+            </a:pPr>
+            <a:r>
+              <a:rPr lang="en-US" sz="2000" b="1" dirty="0">
+                <a:effectLst/>
+                <a:latin typeface="Calibri" panose="020F0502020204030204" pitchFamily="34" charset="0"/>
+                <a:ea typeface="Calibri" panose="020F0502020204030204" pitchFamily="34" charset="0"/>
+                <a:cs typeface="Times New Roman" panose="02020603050405020304" pitchFamily="18" charset="0"/>
+              </a:rPr>
+              <a:t>Null hypothesis: </a:t>
+            </a:r>
+            <a:r>
+              <a:rPr lang="en-US" sz="2000" dirty="0">
+                <a:effectLst/>
+                <a:latin typeface="Calibri" panose="020F0502020204030204" pitchFamily="34" charset="0"/>
+                <a:ea typeface="Calibri" panose="020F0502020204030204" pitchFamily="34" charset="0"/>
+                <a:cs typeface="Times New Roman" panose="02020603050405020304" pitchFamily="18" charset="0"/>
+              </a:rPr>
+              <a:t>There is no significant difference between the questionnaire engagement rate of both groups</a:t>
+            </a:r>
+          </a:p>
+          <a:p>
+            <a:pPr marL="0" marR="0" indent="0">
+              <a:spcBef>
+                <a:spcPts val="0"/>
+              </a:spcBef>
+              <a:spcAft>
+                <a:spcPts val="800"/>
+              </a:spcAft>
+              <a:buNone/>
+            </a:pPr>
+            <a:r>
+              <a:rPr lang="en-US" sz="2000" b="1" dirty="0">
+                <a:effectLst/>
+                <a:latin typeface="Calibri" panose="020F0502020204030204" pitchFamily="34" charset="0"/>
+                <a:ea typeface="Calibri" panose="020F0502020204030204" pitchFamily="34" charset="0"/>
+                <a:cs typeface="Times New Roman" panose="02020603050405020304" pitchFamily="18" charset="0"/>
+              </a:rPr>
+              <a:t>Alt hypothesis: </a:t>
+            </a:r>
+            <a:r>
+              <a:rPr lang="en-US" sz="2000" dirty="0">
+                <a:effectLst/>
+                <a:latin typeface="Calibri" panose="020F0502020204030204" pitchFamily="34" charset="0"/>
+                <a:ea typeface="Calibri" panose="020F0502020204030204" pitchFamily="34" charset="0"/>
+                <a:cs typeface="Times New Roman" panose="02020603050405020304" pitchFamily="18" charset="0"/>
+              </a:rPr>
+              <a:t>There is significant difference between the questionnaire engagement rate of both groups</a:t>
+            </a:r>
+          </a:p>
+          <a:p>
+            <a:pPr marL="0" marR="0" indent="0">
+              <a:spcBef>
+                <a:spcPts val="0"/>
+              </a:spcBef>
+              <a:spcAft>
+                <a:spcPts val="800"/>
+              </a:spcAft>
+              <a:buNone/>
+            </a:pPr>
+            <a:r>
+              <a:rPr lang="en-US" sz="2000" dirty="0">
+                <a:latin typeface="Calibri" panose="020F0502020204030204" pitchFamily="34" charset="0"/>
+                <a:ea typeface="Calibri" panose="020F0502020204030204" pitchFamily="34" charset="0"/>
+                <a:cs typeface="Times New Roman" panose="02020603050405020304" pitchFamily="18" charset="0"/>
+              </a:rPr>
+              <a:t>P</a:t>
+            </a:r>
+            <a:r>
+              <a:rPr lang="en-US" sz="2000" dirty="0">
+                <a:effectLst/>
+                <a:latin typeface="Calibri" panose="020F0502020204030204" pitchFamily="34" charset="0"/>
+                <a:ea typeface="Calibri" panose="020F0502020204030204" pitchFamily="34" charset="0"/>
+                <a:cs typeface="Times New Roman" panose="02020603050405020304" pitchFamily="18" charset="0"/>
+              </a:rPr>
+              <a:t> value: 0.052</a:t>
+            </a:r>
+          </a:p>
+          <a:p>
+            <a:pPr marL="0" marR="0">
+              <a:spcBef>
+                <a:spcPts val="0"/>
+              </a:spcBef>
+              <a:spcAft>
+                <a:spcPts val="800"/>
+              </a:spcAft>
+            </a:pPr>
+            <a:r>
+              <a:rPr lang="en-US" sz="2000" dirty="0">
+                <a:effectLst/>
+                <a:latin typeface="Calibri" panose="020F0502020204030204" pitchFamily="34" charset="0"/>
+                <a:ea typeface="Calibri" panose="020F0502020204030204" pitchFamily="34" charset="0"/>
+                <a:cs typeface="Times New Roman" panose="02020603050405020304" pitchFamily="18" charset="0"/>
+              </a:rPr>
+              <a:t>Since the p value is greater than 0.05, then we fail to reject the null hypothesis. There is no significant difference in questionnaire engagement between the control group and the exposed group. </a:t>
+            </a:r>
+          </a:p>
+          <a:p>
+            <a:pPr marL="0" marR="0">
+              <a:spcBef>
+                <a:spcPts val="0"/>
+              </a:spcBef>
+              <a:spcAft>
+                <a:spcPts val="800"/>
+              </a:spcAft>
+            </a:pPr>
+            <a:r>
+              <a:rPr lang="en-US" sz="2000" dirty="0">
+                <a:effectLst/>
+                <a:latin typeface="Calibri" panose="020F0502020204030204" pitchFamily="34" charset="0"/>
+                <a:ea typeface="Calibri" panose="020F0502020204030204" pitchFamily="34" charset="0"/>
+                <a:cs typeface="Times New Roman" panose="02020603050405020304" pitchFamily="18" charset="0"/>
+              </a:rPr>
+              <a:t>When filtering out the no response answers. The proportion of users that clicked on yes or no is about the same in both groups. </a:t>
+            </a:r>
+          </a:p>
+        </p:txBody>
+      </p:sp>
+    </p:spTree>
+    <p:extLst>
+      <p:ext uri="{BB962C8B-B14F-4D97-AF65-F5344CB8AC3E}">
+        <p14:creationId xmlns:p14="http://schemas.microsoft.com/office/powerpoint/2010/main" val="1045803295"/>
+      </p:ext>
+    </p:extLst>
+  </p:cSld>
+  <p:clrMapOvr>
+    <a:masterClrMapping/>
+  </p:clrMapOvr>
+</p:sld>
+</file>
+
 <file path=ppt/theme/theme1.xml><?xml version="1.0" encoding="utf-8"?>
 <a:theme xmlns:a="http://schemas.openxmlformats.org/drawingml/2006/main" name="Office Theme">
   <a:themeElements>

</xml_diff>

<commit_message>
update to final project report
</commit_message>
<xml_diff>
--- a/Capstone 3 - AB Testing/Reports/Capstone 3 - Ad AB Testing Final Presentation.pptx
+++ b/Capstone 3 - AB Testing/Reports/Capstone 3 - Ad AB Testing Final Presentation.pptx
@@ -18,7 +18,8 @@
     <p:sldId id="284" r:id="rId12"/>
     <p:sldId id="282" r:id="rId13"/>
     <p:sldId id="280" r:id="rId14"/>
-    <p:sldId id="264" r:id="rId15"/>
+    <p:sldId id="285" r:id="rId15"/>
+    <p:sldId id="264" r:id="rId16"/>
   </p:sldIdLst>
   <p:sldSz cx="12192000" cy="6858000"/>
   <p:notesSz cx="6858000" cy="9144000"/>
@@ -138,7 +139,7 @@
   <pc:docChgLst>
     <pc:chgData name="Kenney Kwan" userId="7e8312c5ae1ba077" providerId="LiveId" clId="{7B00C2FD-0E43-40FA-94CB-0CCCA6440D89}"/>
     <pc:docChg chg="undo redo custSel addSld delSld modSld sldOrd">
-      <pc:chgData name="Kenney Kwan" userId="7e8312c5ae1ba077" providerId="LiveId" clId="{7B00C2FD-0E43-40FA-94CB-0CCCA6440D89}" dt="2021-10-28T20:28:22.733" v="1734" actId="47"/>
+      <pc:chgData name="Kenney Kwan" userId="7e8312c5ae1ba077" providerId="LiveId" clId="{7B00C2FD-0E43-40FA-94CB-0CCCA6440D89}" dt="2021-11-05T01:42:16.488" v="1881" actId="33524"/>
       <pc:docMkLst>
         <pc:docMk/>
       </pc:docMkLst>
@@ -1504,7 +1505,7 @@
         </pc:picChg>
       </pc:sldChg>
       <pc:sldChg chg="modSp add mod ord">
-        <pc:chgData name="Kenney Kwan" userId="7e8312c5ae1ba077" providerId="LiveId" clId="{7B00C2FD-0E43-40FA-94CB-0CCCA6440D89}" dt="2021-10-28T19:58:14.526" v="1179" actId="20577"/>
+        <pc:chgData name="Kenney Kwan" userId="7e8312c5ae1ba077" providerId="LiveId" clId="{7B00C2FD-0E43-40FA-94CB-0CCCA6440D89}" dt="2021-11-05T01:41:07.238" v="1751" actId="14100"/>
         <pc:sldMkLst>
           <pc:docMk/>
           <pc:sldMk cId="8007037" sldId="280"/>
@@ -1518,7 +1519,7 @@
           </ac:spMkLst>
         </pc:spChg>
         <pc:spChg chg="mod">
-          <ac:chgData name="Kenney Kwan" userId="7e8312c5ae1ba077" providerId="LiveId" clId="{7B00C2FD-0E43-40FA-94CB-0CCCA6440D89}" dt="2021-10-28T19:58:14.526" v="1179" actId="20577"/>
+          <ac:chgData name="Kenney Kwan" userId="7e8312c5ae1ba077" providerId="LiveId" clId="{7B00C2FD-0E43-40FA-94CB-0CCCA6440D89}" dt="2021-11-05T01:41:07.238" v="1751" actId="14100"/>
           <ac:spMkLst>
             <pc:docMk/>
             <pc:sldMk cId="8007037" sldId="280"/>
@@ -1801,6 +1802,21 @@
           <pc:docMk/>
           <pc:sldMk cId="2866095352" sldId="284"/>
         </pc:sldMkLst>
+      </pc:sldChg>
+      <pc:sldChg chg="modSp add mod">
+        <pc:chgData name="Kenney Kwan" userId="7e8312c5ae1ba077" providerId="LiveId" clId="{7B00C2FD-0E43-40FA-94CB-0CCCA6440D89}" dt="2021-11-05T01:42:16.488" v="1881" actId="33524"/>
+        <pc:sldMkLst>
+          <pc:docMk/>
+          <pc:sldMk cId="2457074933" sldId="285"/>
+        </pc:sldMkLst>
+        <pc:spChg chg="mod">
+          <ac:chgData name="Kenney Kwan" userId="7e8312c5ae1ba077" providerId="LiveId" clId="{7B00C2FD-0E43-40FA-94CB-0CCCA6440D89}" dt="2021-11-05T01:42:16.488" v="1881" actId="33524"/>
+          <ac:spMkLst>
+            <pc:docMk/>
+            <pc:sldMk cId="2457074933" sldId="285"/>
+            <ac:spMk id="3" creationId="{1AC994BF-ABF2-4936-BB7B-56B14404FF6D}"/>
+          </ac:spMkLst>
+        </pc:spChg>
       </pc:sldChg>
     </pc:docChg>
   </pc:docChgLst>
@@ -1954,7 +1970,7 @@
           <a:p>
             <a:fld id="{C6A0D880-9F6E-4441-B894-A7B028150A7F}" type="datetimeFigureOut">
               <a:rPr lang="en-US" smtClean="0"/>
-              <a:t>10/28/2021</a:t>
+              <a:t>11/4/2021</a:t>
             </a:fld>
             <a:endParaRPr lang="en-US"/>
           </a:p>
@@ -2152,7 +2168,7 @@
           <a:p>
             <a:fld id="{C6A0D880-9F6E-4441-B894-A7B028150A7F}" type="datetimeFigureOut">
               <a:rPr lang="en-US" smtClean="0"/>
-              <a:t>10/28/2021</a:t>
+              <a:t>11/4/2021</a:t>
             </a:fld>
             <a:endParaRPr lang="en-US"/>
           </a:p>
@@ -2360,7 +2376,7 @@
           <a:p>
             <a:fld id="{C6A0D880-9F6E-4441-B894-A7B028150A7F}" type="datetimeFigureOut">
               <a:rPr lang="en-US" smtClean="0"/>
-              <a:t>10/28/2021</a:t>
+              <a:t>11/4/2021</a:t>
             </a:fld>
             <a:endParaRPr lang="en-US"/>
           </a:p>
@@ -2558,7 +2574,7 @@
           <a:p>
             <a:fld id="{C6A0D880-9F6E-4441-B894-A7B028150A7F}" type="datetimeFigureOut">
               <a:rPr lang="en-US" smtClean="0"/>
-              <a:t>10/28/2021</a:t>
+              <a:t>11/4/2021</a:t>
             </a:fld>
             <a:endParaRPr lang="en-US"/>
           </a:p>
@@ -2833,7 +2849,7 @@
           <a:p>
             <a:fld id="{C6A0D880-9F6E-4441-B894-A7B028150A7F}" type="datetimeFigureOut">
               <a:rPr lang="en-US" smtClean="0"/>
-              <a:t>10/28/2021</a:t>
+              <a:t>11/4/2021</a:t>
             </a:fld>
             <a:endParaRPr lang="en-US"/>
           </a:p>
@@ -3098,7 +3114,7 @@
           <a:p>
             <a:fld id="{C6A0D880-9F6E-4441-B894-A7B028150A7F}" type="datetimeFigureOut">
               <a:rPr lang="en-US" smtClean="0"/>
-              <a:t>10/28/2021</a:t>
+              <a:t>11/4/2021</a:t>
             </a:fld>
             <a:endParaRPr lang="en-US"/>
           </a:p>
@@ -3510,7 +3526,7 @@
           <a:p>
             <a:fld id="{C6A0D880-9F6E-4441-B894-A7B028150A7F}" type="datetimeFigureOut">
               <a:rPr lang="en-US" smtClean="0"/>
-              <a:t>10/28/2021</a:t>
+              <a:t>11/4/2021</a:t>
             </a:fld>
             <a:endParaRPr lang="en-US"/>
           </a:p>
@@ -3651,7 +3667,7 @@
           <a:p>
             <a:fld id="{C6A0D880-9F6E-4441-B894-A7B028150A7F}" type="datetimeFigureOut">
               <a:rPr lang="en-US" smtClean="0"/>
-              <a:t>10/28/2021</a:t>
+              <a:t>11/4/2021</a:t>
             </a:fld>
             <a:endParaRPr lang="en-US"/>
           </a:p>
@@ -3764,7 +3780,7 @@
           <a:p>
             <a:fld id="{C6A0D880-9F6E-4441-B894-A7B028150A7F}" type="datetimeFigureOut">
               <a:rPr lang="en-US" smtClean="0"/>
-              <a:t>10/28/2021</a:t>
+              <a:t>11/4/2021</a:t>
             </a:fld>
             <a:endParaRPr lang="en-US"/>
           </a:p>
@@ -4075,7 +4091,7 @@
           <a:p>
             <a:fld id="{C6A0D880-9F6E-4441-B894-A7B028150A7F}" type="datetimeFigureOut">
               <a:rPr lang="en-US" smtClean="0"/>
-              <a:t>10/28/2021</a:t>
+              <a:t>11/4/2021</a:t>
             </a:fld>
             <a:endParaRPr lang="en-US"/>
           </a:p>
@@ -4363,7 +4379,7 @@
           <a:p>
             <a:fld id="{C6A0D880-9F6E-4441-B894-A7B028150A7F}" type="datetimeFigureOut">
               <a:rPr lang="en-US" smtClean="0"/>
-              <a:t>10/28/2021</a:t>
+              <a:t>11/4/2021</a:t>
             </a:fld>
             <a:endParaRPr lang="en-US"/>
           </a:p>
@@ -4604,7 +4620,7 @@
           <a:p>
             <a:fld id="{C6A0D880-9F6E-4441-B894-A7B028150A7F}" type="datetimeFigureOut">
               <a:rPr lang="en-US" smtClean="0"/>
-              <a:t>10/28/2021</a:t>
+              <a:t>11/4/2021</a:t>
             </a:fld>
             <a:endParaRPr lang="en-US"/>
           </a:p>
@@ -8769,8 +8785,8 @@
         </p:nvSpPr>
         <p:spPr>
           <a:xfrm>
-            <a:off x="6271146" y="1356285"/>
-            <a:ext cx="5082654" cy="4335545"/>
+            <a:off x="6342488" y="812800"/>
+            <a:ext cx="5702299" cy="5397499"/>
           </a:xfrm>
         </p:spPr>
         <p:txBody>
@@ -8778,51 +8794,6 @@
             <a:normAutofit/>
           </a:bodyPr>
           <a:lstStyle/>
-          <a:p>
-            <a:pPr marL="342900" marR="0" lvl="0" indent="-342900">
-              <a:lnSpc>
-                <a:spcPct val="107000"/>
-              </a:lnSpc>
-              <a:spcBef>
-                <a:spcPts val="0"/>
-              </a:spcBef>
-              <a:spcAft>
-                <a:spcPts val="0"/>
-              </a:spcAft>
-              <a:buFont typeface="Symbol" panose="05050102010706020507" pitchFamily="18" charset="2"/>
-              <a:buChar char=""/>
-            </a:pPr>
-            <a:r>
-              <a:rPr lang="en-US" sz="2000" dirty="0">
-                <a:effectLst/>
-                <a:latin typeface="Calibri" panose="020F0502020204030204" pitchFamily="34" charset="0"/>
-                <a:ea typeface="Calibri" panose="020F0502020204030204" pitchFamily="34" charset="0"/>
-                <a:cs typeface="Times New Roman" panose="02020603050405020304" pitchFamily="18" charset="0"/>
-              </a:rPr>
-              <a:t>The data suggests that when looking at yes responses vs no/no response and no response rate, the new ad has more people engaging with the questionnaire. </a:t>
-            </a:r>
-          </a:p>
-          <a:p>
-            <a:pPr marL="342900" marR="0" lvl="0" indent="-342900">
-              <a:lnSpc>
-                <a:spcPct val="107000"/>
-              </a:lnSpc>
-              <a:spcBef>
-                <a:spcPts val="0"/>
-              </a:spcBef>
-              <a:spcAft>
-                <a:spcPts val="0"/>
-              </a:spcAft>
-              <a:buFont typeface="Symbol" panose="05050102010706020507" pitchFamily="18" charset="2"/>
-              <a:buChar char=""/>
-            </a:pPr>
-            <a:endParaRPr lang="en-US" sz="2000" dirty="0">
-              <a:effectLst/>
-              <a:latin typeface="Calibri" panose="020F0502020204030204" pitchFamily="34" charset="0"/>
-              <a:ea typeface="Calibri" panose="020F0502020204030204" pitchFamily="34" charset="0"/>
-              <a:cs typeface="Times New Roman" panose="02020603050405020304" pitchFamily="18" charset="0"/>
-            </a:endParaRPr>
-          </a:p>
           <a:p>
             <a:pPr marL="342900" marR="0" lvl="0" indent="-342900">
               <a:lnSpc>
@@ -8844,7 +8815,55 @@
                 <a:ea typeface="Calibri" panose="020F0502020204030204" pitchFamily="34" charset="0"/>
                 <a:cs typeface="Times New Roman" panose="02020603050405020304" pitchFamily="18" charset="0"/>
               </a:rPr>
-              <a:t>Therefore, I would recommend the business use the new ad as it has shown to increase ad success and higher customer engagement</a:t>
+              <a:t>The data suggests that when looking at yes responses vs no/no response and no response rate, the new ad has more people engaging with the questionnaire. </a:t>
+            </a:r>
+          </a:p>
+          <a:p>
+            <a:pPr marL="342900" marR="0" lvl="0" indent="-342900">
+              <a:lnSpc>
+                <a:spcPct val="107000"/>
+              </a:lnSpc>
+              <a:spcBef>
+                <a:spcPts val="0"/>
+              </a:spcBef>
+              <a:spcAft>
+                <a:spcPts val="800"/>
+              </a:spcAft>
+              <a:buFont typeface="Symbol" panose="05050102010706020507" pitchFamily="18" charset="2"/>
+              <a:buChar char=""/>
+            </a:pPr>
+            <a:r>
+              <a:rPr lang="en-US" sz="2000" dirty="0">
+                <a:effectLst/>
+                <a:latin typeface="Calibri" panose="020F0502020204030204" pitchFamily="34" charset="0"/>
+                <a:ea typeface="Calibri" panose="020F0502020204030204" pitchFamily="34" charset="0"/>
+                <a:cs typeface="Times New Roman" panose="02020603050405020304" pitchFamily="18" charset="0"/>
+              </a:rPr>
+              <a:t>First recommendation – the data suggests the business use the new ad as it has shown to increase ad success and higher customer engagement</a:t>
+            </a:r>
+          </a:p>
+          <a:p>
+            <a:pPr marL="342900" marR="0" lvl="0" indent="-342900">
+              <a:lnSpc>
+                <a:spcPct val="107000"/>
+              </a:lnSpc>
+              <a:spcBef>
+                <a:spcPts val="0"/>
+              </a:spcBef>
+              <a:spcAft>
+                <a:spcPts val="800"/>
+              </a:spcAft>
+              <a:buFont typeface="Symbol" panose="05050102010706020507" pitchFamily="18" charset="2"/>
+              <a:buChar char=""/>
+            </a:pPr>
+            <a:r>
+              <a:rPr lang="en-US" sz="2000" dirty="0">
+                <a:effectLst/>
+                <a:latin typeface="Calibri" panose="020F0502020204030204" pitchFamily="34" charset="0"/>
+                <a:ea typeface="Calibri" panose="020F0502020204030204" pitchFamily="34" charset="0"/>
+                <a:cs typeface="Times New Roman" panose="02020603050405020304" pitchFamily="18" charset="0"/>
+              </a:rPr>
+              <a:t>When looking at the data of yes responses vs no responses, there was no significant difference between groups. </a:t>
             </a:r>
           </a:p>
           <a:p>
@@ -8870,6 +8889,692 @@
 </file>
 
 <file path=ppt/slides/slide14.xml><?xml version="1.0" encoding="utf-8"?>
+<p:sld xmlns:a="http://schemas.openxmlformats.org/drawingml/2006/main" xmlns:r="http://schemas.openxmlformats.org/officeDocument/2006/relationships" xmlns:p="http://schemas.openxmlformats.org/presentationml/2006/main">
+  <p:cSld>
+    <p:bg>
+      <p:bgPr>
+        <a:solidFill>
+          <a:schemeClr val="bg1">
+            <a:tint val="95000"/>
+            <a:satMod val="170000"/>
+          </a:schemeClr>
+        </a:solidFill>
+        <a:effectLst/>
+      </p:bgPr>
+    </p:bg>
+    <p:spTree>
+      <p:nvGrpSpPr>
+        <p:cNvPr id="1" name=""/>
+        <p:cNvGrpSpPr/>
+        <p:nvPr/>
+      </p:nvGrpSpPr>
+      <p:grpSpPr>
+        <a:xfrm>
+          <a:off x="0" y="0"/>
+          <a:ext cx="0" cy="0"/>
+          <a:chOff x="0" y="0"/>
+          <a:chExt cx="0" cy="0"/>
+        </a:xfrm>
+      </p:grpSpPr>
+      <p:sp>
+        <p:nvSpPr>
+          <p:cNvPr id="27" name="Rectangle 26">
+            <a:extLst>
+              <a:ext uri="{FF2B5EF4-FFF2-40B4-BE49-F238E27FC236}">
+                <a16:creationId xmlns:a16="http://schemas.microsoft.com/office/drawing/2014/main" id="{AA2C266F-E6D2-44F1-B910-9FADE4044089}"/>
+              </a:ext>
+              <a:ext uri="{C183D7F6-B498-43B3-948B-1728B52AA6E4}">
+                <adec:decorative xmlns:adec="http://schemas.microsoft.com/office/drawing/2017/decorative" val="1"/>
+              </a:ext>
+            </a:extLst>
+          </p:cNvPr>
+          <p:cNvSpPr>
+            <a:spLocks noGrp="1" noRot="1" noChangeAspect="1" noMove="1" noResize="1" noEditPoints="1" noAdjustHandles="1" noChangeArrowheads="1" noChangeShapeType="1" noTextEdit="1"/>
+          </p:cNvSpPr>
+          <p:nvPr>
+            <p:extLst>
+              <p:ext uri="{386F3935-93C4-4BCD-93E2-E3B085C9AB24}">
+                <p16:designElem xmlns:p16="http://schemas.microsoft.com/office/powerpoint/2015/main" val="1"/>
+              </p:ext>
+            </p:extLst>
+          </p:nvPr>
+        </p:nvSpPr>
+        <p:spPr>
+          <a:xfrm>
+            <a:off x="0" y="0"/>
+            <a:ext cx="12192000" cy="6858478"/>
+          </a:xfrm>
+          <a:prstGeom prst="rect">
+            <a:avLst/>
+          </a:prstGeom>
+          <a:solidFill>
+            <a:srgbClr val="404040">
+              <a:alpha val="85000"/>
+            </a:srgbClr>
+          </a:solidFill>
+          <a:ln>
+            <a:noFill/>
+          </a:ln>
+        </p:spPr>
+        <p:style>
+          <a:lnRef idx="2">
+            <a:schemeClr val="accent1">
+              <a:shade val="50000"/>
+            </a:schemeClr>
+          </a:lnRef>
+          <a:fillRef idx="1">
+            <a:schemeClr val="accent1"/>
+          </a:fillRef>
+          <a:effectRef idx="0">
+            <a:schemeClr val="accent1"/>
+          </a:effectRef>
+          <a:fontRef idx="minor">
+            <a:schemeClr val="lt1"/>
+          </a:fontRef>
+        </p:style>
+        <p:txBody>
+          <a:bodyPr rtlCol="0" anchor="ctr"/>
+          <a:lstStyle/>
+          <a:p>
+            <a:pPr algn="ctr"/>
+            <a:endParaRPr lang="en-US" dirty="0"/>
+          </a:p>
+        </p:txBody>
+      </p:sp>
+      <p:sp>
+        <p:nvSpPr>
+          <p:cNvPr id="29" name="Freeform: Shape 28">
+            <a:extLst>
+              <a:ext uri="{FF2B5EF4-FFF2-40B4-BE49-F238E27FC236}">
+                <a16:creationId xmlns:a16="http://schemas.microsoft.com/office/drawing/2014/main" id="{232B8A28-B0F8-48EA-BB11-AD0D29CC3F3C}"/>
+              </a:ext>
+              <a:ext uri="{C183D7F6-B498-43B3-948B-1728B52AA6E4}">
+                <adec:decorative xmlns:adec="http://schemas.microsoft.com/office/drawing/2017/decorative" val="1"/>
+              </a:ext>
+            </a:extLst>
+          </p:cNvPr>
+          <p:cNvSpPr>
+            <a:spLocks noGrp="1" noRot="1" noChangeAspect="1" noMove="1" noResize="1" noEditPoints="1" noAdjustHandles="1" noChangeArrowheads="1" noChangeShapeType="1" noTextEdit="1"/>
+          </p:cNvSpPr>
+          <p:nvPr>
+            <p:extLst>
+              <p:ext uri="{386F3935-93C4-4BCD-93E2-E3B085C9AB24}">
+                <p16:designElem xmlns:p16="http://schemas.microsoft.com/office/powerpoint/2015/main" val="1"/>
+              </p:ext>
+            </p:extLst>
+          </p:nvPr>
+        </p:nvSpPr>
+        <p:spPr>
+          <a:xfrm>
+            <a:off x="0" y="-478"/>
+            <a:ext cx="6922542" cy="6858478"/>
+          </a:xfrm>
+          <a:custGeom>
+            <a:avLst/>
+            <a:gdLst>
+              <a:gd name="connsiteX0" fmla="*/ 0 w 6922542"/>
+              <a:gd name="connsiteY0" fmla="*/ 0 h 6858478"/>
+              <a:gd name="connsiteX1" fmla="*/ 2674362 w 6922542"/>
+              <a:gd name="connsiteY1" fmla="*/ 0 h 6858478"/>
+              <a:gd name="connsiteX2" fmla="*/ 3740590 w 6922542"/>
+              <a:gd name="connsiteY2" fmla="*/ 0 h 6858478"/>
+              <a:gd name="connsiteX3" fmla="*/ 3746167 w 6922542"/>
+              <a:gd name="connsiteY3" fmla="*/ 0 h 6858478"/>
+              <a:gd name="connsiteX4" fmla="*/ 6922542 w 6922542"/>
+              <a:gd name="connsiteY4" fmla="*/ 6858478 h 6858478"/>
+              <a:gd name="connsiteX5" fmla="*/ 0 w 6922542"/>
+              <a:gd name="connsiteY5" fmla="*/ 6858478 h 6858478"/>
+            </a:gdLst>
+            <a:ahLst/>
+            <a:cxnLst>
+              <a:cxn ang="0">
+                <a:pos x="connsiteX0" y="connsiteY0"/>
+              </a:cxn>
+              <a:cxn ang="0">
+                <a:pos x="connsiteX1" y="connsiteY1"/>
+              </a:cxn>
+              <a:cxn ang="0">
+                <a:pos x="connsiteX2" y="connsiteY2"/>
+              </a:cxn>
+              <a:cxn ang="0">
+                <a:pos x="connsiteX3" y="connsiteY3"/>
+              </a:cxn>
+              <a:cxn ang="0">
+                <a:pos x="connsiteX4" y="connsiteY4"/>
+              </a:cxn>
+              <a:cxn ang="0">
+                <a:pos x="connsiteX5" y="connsiteY5"/>
+              </a:cxn>
+            </a:cxnLst>
+            <a:rect l="l" t="t" r="r" b="b"/>
+            <a:pathLst>
+              <a:path w="6922542" h="6858478">
+                <a:moveTo>
+                  <a:pt x="0" y="0"/>
+                </a:moveTo>
+                <a:lnTo>
+                  <a:pt x="2674362" y="0"/>
+                </a:lnTo>
+                <a:lnTo>
+                  <a:pt x="3740590" y="0"/>
+                </a:lnTo>
+                <a:lnTo>
+                  <a:pt x="3746167" y="0"/>
+                </a:lnTo>
+                <a:lnTo>
+                  <a:pt x="6922542" y="6858478"/>
+                </a:lnTo>
+                <a:lnTo>
+                  <a:pt x="0" y="6858478"/>
+                </a:lnTo>
+                <a:close/>
+              </a:path>
+            </a:pathLst>
+          </a:custGeom>
+          <a:solidFill>
+            <a:srgbClr val="FFFFFF"/>
+          </a:solidFill>
+          <a:ln>
+            <a:noFill/>
+          </a:ln>
+        </p:spPr>
+        <p:style>
+          <a:lnRef idx="2">
+            <a:schemeClr val="accent1">
+              <a:shade val="50000"/>
+            </a:schemeClr>
+          </a:lnRef>
+          <a:fillRef idx="1">
+            <a:schemeClr val="accent1"/>
+          </a:fillRef>
+          <a:effectRef idx="0">
+            <a:schemeClr val="accent1"/>
+          </a:effectRef>
+          <a:fontRef idx="minor">
+            <a:schemeClr val="lt1"/>
+          </a:fontRef>
+        </p:style>
+        <p:txBody>
+          <a:bodyPr wrap="square" rtlCol="0" anchor="ctr">
+            <a:noAutofit/>
+          </a:bodyPr>
+          <a:lstStyle/>
+          <a:p>
+            <a:pPr algn="ctr"/>
+            <a:endParaRPr lang="en-US"/>
+          </a:p>
+        </p:txBody>
+      </p:sp>
+      <p:sp>
+        <p:nvSpPr>
+          <p:cNvPr id="31" name="Freeform: Shape 30">
+            <a:extLst>
+              <a:ext uri="{FF2B5EF4-FFF2-40B4-BE49-F238E27FC236}">
+                <a16:creationId xmlns:a16="http://schemas.microsoft.com/office/drawing/2014/main" id="{CED05210-F855-4657-BDA5-CF310B3D1400}"/>
+              </a:ext>
+              <a:ext uri="{C183D7F6-B498-43B3-948B-1728B52AA6E4}">
+                <adec:decorative xmlns:adec="http://schemas.microsoft.com/office/drawing/2017/decorative" val="1"/>
+              </a:ext>
+            </a:extLst>
+          </p:cNvPr>
+          <p:cNvSpPr>
+            <a:spLocks noGrp="1" noRot="1" noChangeAspect="1" noMove="1" noResize="1" noEditPoints="1" noAdjustHandles="1" noChangeArrowheads="1" noChangeShapeType="1" noTextEdit="1"/>
+          </p:cNvSpPr>
+          <p:nvPr>
+            <p:extLst>
+              <p:ext uri="{386F3935-93C4-4BCD-93E2-E3B085C9AB24}">
+                <p16:designElem xmlns:p16="http://schemas.microsoft.com/office/powerpoint/2015/main" val="1"/>
+              </p:ext>
+            </p:extLst>
+          </p:nvPr>
+        </p:nvSpPr>
+        <p:spPr>
+          <a:xfrm>
+            <a:off x="0" y="329392"/>
+            <a:ext cx="6594432" cy="6528608"/>
+          </a:xfrm>
+          <a:custGeom>
+            <a:avLst/>
+            <a:gdLst>
+              <a:gd name="connsiteX0" fmla="*/ 0 w 6594432"/>
+              <a:gd name="connsiteY0" fmla="*/ 0 h 6528608"/>
+              <a:gd name="connsiteX1" fmla="*/ 2050216 w 6594432"/>
+              <a:gd name="connsiteY1" fmla="*/ 0 h 6528608"/>
+              <a:gd name="connsiteX2" fmla="*/ 3084046 w 6594432"/>
+              <a:gd name="connsiteY2" fmla="*/ 0 h 6528608"/>
+              <a:gd name="connsiteX3" fmla="*/ 3555715 w 6594432"/>
+              <a:gd name="connsiteY3" fmla="*/ 0 h 6528608"/>
+              <a:gd name="connsiteX4" fmla="*/ 6594432 w 6594432"/>
+              <a:gd name="connsiteY4" fmla="*/ 6528607 h 6528608"/>
+              <a:gd name="connsiteX5" fmla="*/ 6259915 w 6594432"/>
+              <a:gd name="connsiteY5" fmla="*/ 6528607 h 6528608"/>
+              <a:gd name="connsiteX6" fmla="*/ 6259915 w 6594432"/>
+              <a:gd name="connsiteY6" fmla="*/ 6528608 h 6528608"/>
+              <a:gd name="connsiteX7" fmla="*/ 0 w 6594432"/>
+              <a:gd name="connsiteY7" fmla="*/ 6528608 h 6528608"/>
+            </a:gdLst>
+            <a:ahLst/>
+            <a:cxnLst>
+              <a:cxn ang="0">
+                <a:pos x="connsiteX0" y="connsiteY0"/>
+              </a:cxn>
+              <a:cxn ang="0">
+                <a:pos x="connsiteX1" y="connsiteY1"/>
+              </a:cxn>
+              <a:cxn ang="0">
+                <a:pos x="connsiteX2" y="connsiteY2"/>
+              </a:cxn>
+              <a:cxn ang="0">
+                <a:pos x="connsiteX3" y="connsiteY3"/>
+              </a:cxn>
+              <a:cxn ang="0">
+                <a:pos x="connsiteX4" y="connsiteY4"/>
+              </a:cxn>
+              <a:cxn ang="0">
+                <a:pos x="connsiteX5" y="connsiteY5"/>
+              </a:cxn>
+              <a:cxn ang="0">
+                <a:pos x="connsiteX6" y="connsiteY6"/>
+              </a:cxn>
+              <a:cxn ang="0">
+                <a:pos x="connsiteX7" y="connsiteY7"/>
+              </a:cxn>
+            </a:cxnLst>
+            <a:rect l="l" t="t" r="r" b="b"/>
+            <a:pathLst>
+              <a:path w="6594432" h="6528608">
+                <a:moveTo>
+                  <a:pt x="0" y="0"/>
+                </a:moveTo>
+                <a:lnTo>
+                  <a:pt x="2050216" y="0"/>
+                </a:lnTo>
+                <a:lnTo>
+                  <a:pt x="3084046" y="0"/>
+                </a:lnTo>
+                <a:lnTo>
+                  <a:pt x="3555715" y="0"/>
+                </a:lnTo>
+                <a:lnTo>
+                  <a:pt x="6594432" y="6528607"/>
+                </a:lnTo>
+                <a:lnTo>
+                  <a:pt x="6259915" y="6528607"/>
+                </a:lnTo>
+                <a:lnTo>
+                  <a:pt x="6259915" y="6528608"/>
+                </a:lnTo>
+                <a:lnTo>
+                  <a:pt x="0" y="6528608"/>
+                </a:lnTo>
+                <a:close/>
+              </a:path>
+            </a:pathLst>
+          </a:custGeom>
+          <a:solidFill>
+            <a:schemeClr val="accent1">
+              <a:lumMod val="100000"/>
+              <a:lumOff val="0"/>
+              <a:alpha val="70000"/>
+            </a:schemeClr>
+          </a:solidFill>
+          <a:ln>
+            <a:noFill/>
+          </a:ln>
+        </p:spPr>
+        <p:style>
+          <a:lnRef idx="2">
+            <a:schemeClr val="accent1">
+              <a:shade val="50000"/>
+            </a:schemeClr>
+          </a:lnRef>
+          <a:fillRef idx="1">
+            <a:schemeClr val="accent1"/>
+          </a:fillRef>
+          <a:effectRef idx="0">
+            <a:schemeClr val="accent1"/>
+          </a:effectRef>
+          <a:fontRef idx="minor">
+            <a:schemeClr val="lt1"/>
+          </a:fontRef>
+        </p:style>
+        <p:txBody>
+          <a:bodyPr wrap="square" rtlCol="0" anchor="ctr">
+            <a:noAutofit/>
+          </a:bodyPr>
+          <a:lstStyle/>
+          <a:p>
+            <a:pPr algn="ctr"/>
+            <a:endParaRPr lang="en-US"/>
+          </a:p>
+        </p:txBody>
+      </p:sp>
+      <p:sp>
+        <p:nvSpPr>
+          <p:cNvPr id="33" name="Freeform: Shape 32">
+            <a:extLst>
+              <a:ext uri="{FF2B5EF4-FFF2-40B4-BE49-F238E27FC236}">
+                <a16:creationId xmlns:a16="http://schemas.microsoft.com/office/drawing/2014/main" id="{76BD6A71-5DCB-4373-810E-0C269DB8C8A7}"/>
+              </a:ext>
+              <a:ext uri="{C183D7F6-B498-43B3-948B-1728B52AA6E4}">
+                <adec:decorative xmlns:adec="http://schemas.microsoft.com/office/drawing/2017/decorative" val="1"/>
+              </a:ext>
+            </a:extLst>
+          </p:cNvPr>
+          <p:cNvSpPr>
+            <a:spLocks noGrp="1" noRot="1" noChangeAspect="1" noMove="1" noResize="1" noEditPoints="1" noAdjustHandles="1" noChangeArrowheads="1" noChangeShapeType="1" noTextEdit="1"/>
+          </p:cNvSpPr>
+          <p:nvPr>
+            <p:extLst>
+              <p:ext uri="{386F3935-93C4-4BCD-93E2-E3B085C9AB24}">
+                <p16:designElem xmlns:p16="http://schemas.microsoft.com/office/powerpoint/2015/main" val="1"/>
+              </p:ext>
+            </p:extLst>
+          </p:nvPr>
+        </p:nvSpPr>
+        <p:spPr>
+          <a:xfrm>
+            <a:off x="0" y="535258"/>
+            <a:ext cx="6342489" cy="6322742"/>
+          </a:xfrm>
+          <a:custGeom>
+            <a:avLst/>
+            <a:gdLst>
+              <a:gd name="connsiteX0" fmla="*/ 0 w 6342489"/>
+              <a:gd name="connsiteY0" fmla="*/ 0 h 6322742"/>
+              <a:gd name="connsiteX1" fmla="*/ 1941565 w 6342489"/>
+              <a:gd name="connsiteY1" fmla="*/ 0 h 6322742"/>
+              <a:gd name="connsiteX2" fmla="*/ 2942795 w 6342489"/>
+              <a:gd name="connsiteY2" fmla="*/ 0 h 6322742"/>
+              <a:gd name="connsiteX3" fmla="*/ 3399591 w 6342489"/>
+              <a:gd name="connsiteY3" fmla="*/ 0 h 6322742"/>
+              <a:gd name="connsiteX4" fmla="*/ 6342489 w 6342489"/>
+              <a:gd name="connsiteY4" fmla="*/ 6322741 h 6322742"/>
+              <a:gd name="connsiteX5" fmla="*/ 6018520 w 6342489"/>
+              <a:gd name="connsiteY5" fmla="*/ 6322741 h 6322742"/>
+              <a:gd name="connsiteX6" fmla="*/ 6018520 w 6342489"/>
+              <a:gd name="connsiteY6" fmla="*/ 6322742 h 6322742"/>
+              <a:gd name="connsiteX7" fmla="*/ 0 w 6342489"/>
+              <a:gd name="connsiteY7" fmla="*/ 6322742 h 6322742"/>
+            </a:gdLst>
+            <a:ahLst/>
+            <a:cxnLst>
+              <a:cxn ang="0">
+                <a:pos x="connsiteX0" y="connsiteY0"/>
+              </a:cxn>
+              <a:cxn ang="0">
+                <a:pos x="connsiteX1" y="connsiteY1"/>
+              </a:cxn>
+              <a:cxn ang="0">
+                <a:pos x="connsiteX2" y="connsiteY2"/>
+              </a:cxn>
+              <a:cxn ang="0">
+                <a:pos x="connsiteX3" y="connsiteY3"/>
+              </a:cxn>
+              <a:cxn ang="0">
+                <a:pos x="connsiteX4" y="connsiteY4"/>
+              </a:cxn>
+              <a:cxn ang="0">
+                <a:pos x="connsiteX5" y="connsiteY5"/>
+              </a:cxn>
+              <a:cxn ang="0">
+                <a:pos x="connsiteX6" y="connsiteY6"/>
+              </a:cxn>
+              <a:cxn ang="0">
+                <a:pos x="connsiteX7" y="connsiteY7"/>
+              </a:cxn>
+            </a:cxnLst>
+            <a:rect l="l" t="t" r="r" b="b"/>
+            <a:pathLst>
+              <a:path w="6342489" h="6322742">
+                <a:moveTo>
+                  <a:pt x="0" y="0"/>
+                </a:moveTo>
+                <a:lnTo>
+                  <a:pt x="1941565" y="0"/>
+                </a:lnTo>
+                <a:lnTo>
+                  <a:pt x="2942795" y="0"/>
+                </a:lnTo>
+                <a:lnTo>
+                  <a:pt x="3399591" y="0"/>
+                </a:lnTo>
+                <a:lnTo>
+                  <a:pt x="6342489" y="6322741"/>
+                </a:lnTo>
+                <a:lnTo>
+                  <a:pt x="6018520" y="6322741"/>
+                </a:lnTo>
+                <a:lnTo>
+                  <a:pt x="6018520" y="6322742"/>
+                </a:lnTo>
+                <a:lnTo>
+                  <a:pt x="0" y="6322742"/>
+                </a:lnTo>
+                <a:close/>
+              </a:path>
+            </a:pathLst>
+          </a:custGeom>
+          <a:solidFill>
+            <a:schemeClr val="accent1">
+              <a:lumMod val="100000"/>
+              <a:lumOff val="0"/>
+            </a:schemeClr>
+          </a:solidFill>
+          <a:ln>
+            <a:noFill/>
+          </a:ln>
+        </p:spPr>
+        <p:style>
+          <a:lnRef idx="2">
+            <a:schemeClr val="accent1">
+              <a:shade val="50000"/>
+            </a:schemeClr>
+          </a:lnRef>
+          <a:fillRef idx="1">
+            <a:schemeClr val="accent1"/>
+          </a:fillRef>
+          <a:effectRef idx="0">
+            <a:schemeClr val="accent1"/>
+          </a:effectRef>
+          <a:fontRef idx="minor">
+            <a:schemeClr val="lt1"/>
+          </a:fontRef>
+        </p:style>
+        <p:txBody>
+          <a:bodyPr wrap="square" rtlCol="0" anchor="ctr">
+            <a:noAutofit/>
+          </a:bodyPr>
+          <a:lstStyle/>
+          <a:p>
+            <a:pPr algn="ctr"/>
+            <a:endParaRPr lang="en-US"/>
+          </a:p>
+        </p:txBody>
+      </p:sp>
+      <p:sp>
+        <p:nvSpPr>
+          <p:cNvPr id="2" name="Title 1">
+            <a:extLst>
+              <a:ext uri="{FF2B5EF4-FFF2-40B4-BE49-F238E27FC236}">
+                <a16:creationId xmlns:a16="http://schemas.microsoft.com/office/drawing/2014/main" id="{424E4552-B777-4187-8FD3-061EA04D4793}"/>
+              </a:ext>
+            </a:extLst>
+          </p:cNvPr>
+          <p:cNvSpPr>
+            <a:spLocks noGrp="1"/>
+          </p:cNvSpPr>
+          <p:nvPr>
+            <p:ph type="title"/>
+          </p:nvPr>
+        </p:nvSpPr>
+        <p:spPr>
+          <a:xfrm>
+            <a:off x="457198" y="2113470"/>
+            <a:ext cx="4152901" cy="3207830"/>
+          </a:xfrm>
+        </p:spPr>
+        <p:txBody>
+          <a:bodyPr>
+            <a:normAutofit/>
+          </a:bodyPr>
+          <a:lstStyle/>
+          <a:p>
+            <a:r>
+              <a:rPr lang="en-US" sz="4200" b="1" dirty="0">
+                <a:solidFill>
+                  <a:srgbClr val="FFFFFF"/>
+                </a:solidFill>
+              </a:rPr>
+              <a:t>Recommendations</a:t>
+            </a:r>
+            <a:endParaRPr lang="en-US" sz="4200" dirty="0">
+              <a:solidFill>
+                <a:srgbClr val="FFFFFF"/>
+              </a:solidFill>
+            </a:endParaRPr>
+          </a:p>
+        </p:txBody>
+      </p:sp>
+      <p:sp>
+        <p:nvSpPr>
+          <p:cNvPr id="3" name="Content Placeholder 2">
+            <a:extLst>
+              <a:ext uri="{FF2B5EF4-FFF2-40B4-BE49-F238E27FC236}">
+                <a16:creationId xmlns:a16="http://schemas.microsoft.com/office/drawing/2014/main" id="{1AC994BF-ABF2-4936-BB7B-56B14404FF6D}"/>
+              </a:ext>
+            </a:extLst>
+          </p:cNvPr>
+          <p:cNvSpPr>
+            <a:spLocks noGrp="1"/>
+          </p:cNvSpPr>
+          <p:nvPr>
+            <p:ph idx="1"/>
+          </p:nvPr>
+        </p:nvSpPr>
+        <p:spPr>
+          <a:xfrm>
+            <a:off x="6052712" y="534780"/>
+            <a:ext cx="6139288" cy="5765799"/>
+          </a:xfrm>
+        </p:spPr>
+        <p:txBody>
+          <a:bodyPr anchor="ctr">
+            <a:normAutofit/>
+          </a:bodyPr>
+          <a:lstStyle/>
+          <a:p>
+            <a:pPr marL="342900" marR="0" lvl="0" indent="-342900">
+              <a:lnSpc>
+                <a:spcPct val="107000"/>
+              </a:lnSpc>
+              <a:spcBef>
+                <a:spcPts val="0"/>
+              </a:spcBef>
+              <a:spcAft>
+                <a:spcPts val="800"/>
+              </a:spcAft>
+              <a:buFont typeface="Symbol" panose="05050102010706020507" pitchFamily="18" charset="2"/>
+              <a:buChar char=""/>
+            </a:pPr>
+            <a:r>
+              <a:rPr lang="en-US" sz="2000" dirty="0">
+                <a:effectLst/>
+                <a:latin typeface="Calibri" panose="020F0502020204030204" pitchFamily="34" charset="0"/>
+                <a:ea typeface="Calibri" panose="020F0502020204030204" pitchFamily="34" charset="0"/>
+                <a:cs typeface="Times New Roman" panose="02020603050405020304" pitchFamily="18" charset="0"/>
+              </a:rPr>
+              <a:t>Second recommendation – the data suggests that the business should keep with the old ad, if it is only concerned about the customers that stayed to the end of the ad. However, I would personally steer away from the old ad shown in the other two tests that more people respond to the new ad, and less people click away while in the middle of the ad</a:t>
+            </a:r>
+          </a:p>
+          <a:p>
+            <a:pPr marL="342900" marR="0" lvl="0" indent="-342900">
+              <a:lnSpc>
+                <a:spcPct val="107000"/>
+              </a:lnSpc>
+              <a:spcBef>
+                <a:spcPts val="0"/>
+              </a:spcBef>
+              <a:spcAft>
+                <a:spcPts val="800"/>
+              </a:spcAft>
+              <a:buFont typeface="Symbol" panose="05050102010706020507" pitchFamily="18" charset="2"/>
+              <a:buChar char=""/>
+            </a:pPr>
+            <a:r>
+              <a:rPr lang="en-US" sz="2000" dirty="0">
+                <a:effectLst/>
+                <a:latin typeface="Calibri" panose="020F0502020204030204" pitchFamily="34" charset="0"/>
+                <a:ea typeface="Calibri" panose="020F0502020204030204" pitchFamily="34" charset="0"/>
+                <a:cs typeface="Times New Roman" panose="02020603050405020304" pitchFamily="18" charset="0"/>
+              </a:rPr>
+              <a:t>When looking at the data of no response vs response data, the new ad had a lower disengagement rate</a:t>
+            </a:r>
+          </a:p>
+          <a:p>
+            <a:pPr marL="342900" marR="0" lvl="0" indent="-342900">
+              <a:lnSpc>
+                <a:spcPct val="107000"/>
+              </a:lnSpc>
+              <a:spcBef>
+                <a:spcPts val="0"/>
+              </a:spcBef>
+              <a:spcAft>
+                <a:spcPts val="800"/>
+              </a:spcAft>
+              <a:buFont typeface="Symbol" panose="05050102010706020507" pitchFamily="18" charset="2"/>
+              <a:buChar char=""/>
+            </a:pPr>
+            <a:r>
+              <a:rPr lang="en-US" sz="2000" dirty="0">
+                <a:effectLst/>
+                <a:latin typeface="Calibri" panose="020F0502020204030204" pitchFamily="34" charset="0"/>
+                <a:ea typeface="Calibri" panose="020F0502020204030204" pitchFamily="34" charset="0"/>
+                <a:cs typeface="Times New Roman" panose="02020603050405020304" pitchFamily="18" charset="0"/>
+              </a:rPr>
+              <a:t>Third recommendation – the data suggests that the business use the new ad as on average the no response rate of the control group to be 85.61% and the exposed group to be 83.60%. </a:t>
+            </a:r>
+            <a:r>
+              <a:rPr lang="en-US" sz="2000" dirty="0">
+                <a:latin typeface="Calibri" panose="020F0502020204030204" pitchFamily="34" charset="0"/>
+                <a:ea typeface="Calibri" panose="020F0502020204030204" pitchFamily="34" charset="0"/>
+                <a:cs typeface="Times New Roman" panose="02020603050405020304" pitchFamily="18" charset="0"/>
+              </a:rPr>
+              <a:t>T</a:t>
+            </a:r>
+            <a:r>
+              <a:rPr lang="en-US" sz="2000" dirty="0">
+                <a:effectLst/>
+                <a:latin typeface="Calibri" panose="020F0502020204030204" pitchFamily="34" charset="0"/>
+                <a:ea typeface="Calibri" panose="020F0502020204030204" pitchFamily="34" charset="0"/>
+                <a:cs typeface="Times New Roman" panose="02020603050405020304" pitchFamily="18" charset="0"/>
+              </a:rPr>
+              <a:t>he new ad can reach a wider audience with the higher engagement rate </a:t>
+            </a:r>
+          </a:p>
+          <a:p>
+            <a:endParaRPr lang="en-US" sz="2000" dirty="0">
+              <a:solidFill>
+                <a:srgbClr val="FFFFFF"/>
+              </a:solidFill>
+            </a:endParaRPr>
+          </a:p>
+        </p:txBody>
+      </p:sp>
+    </p:spTree>
+    <p:extLst>
+      <p:ext uri="{BB962C8B-B14F-4D97-AF65-F5344CB8AC3E}">
+        <p14:creationId xmlns:p14="http://schemas.microsoft.com/office/powerpoint/2010/main" val="2457074933"/>
+      </p:ext>
+    </p:extLst>
+  </p:cSld>
+  <p:clrMapOvr>
+    <a:overrideClrMapping bg1="dk1" tx1="lt1" bg2="dk2" tx2="lt2" accent1="accent1" accent2="accent2" accent3="accent3" accent4="accent4" accent5="accent5" accent6="accent6" hlink="hlink" folHlink="folHlink"/>
+  </p:clrMapOvr>
+</p:sld>
+</file>
+
+<file path=ppt/slides/slide15.xml><?xml version="1.0" encoding="utf-8"?>
 <p:sld xmlns:a="http://schemas.openxmlformats.org/drawingml/2006/main" xmlns:r="http://schemas.openxmlformats.org/officeDocument/2006/relationships" xmlns:p="http://schemas.openxmlformats.org/presentationml/2006/main">
   <p:cSld>
     <p:bg>

</xml_diff>